<commit_message>
Mise des points forts
Signed-off-by: Benjamin BRAYE <benjamin.braye@viacesi.fr>
</commit_message>
<xml_diff>
--- a/Documentation/ppt_soutenance.pptx
+++ b/Documentation/ppt_soutenance.pptx
@@ -1900,11 +1900,7 @@
         <a:p>
           <a:r>
             <a:rPr lang="fr-FR" dirty="0" smtClean="0"/>
-            <a:t>Perspectives </a:t>
-          </a:r>
-          <a:r>
-            <a:rPr lang="fr-FR" dirty="0" smtClean="0"/>
-            <a:t>d’évolution</a:t>
+            <a:t>Perspectives d’évolution</a:t>
           </a:r>
           <a:endParaRPr lang="fr-FR" dirty="0"/>
         </a:p>
@@ -2228,15 +2224,15 @@
     <dgm:cxn modelId="{8F972EFA-AF93-4957-9117-7BE67628011A}" type="presOf" srcId="{7A23C5F4-0636-4C02-BE1F-C59C73E6A9AB}" destId="{038A3218-D924-4E0F-B106-63B5EE221AC4}" srcOrd="0" destOrd="2" presId="urn:microsoft.com/office/officeart/2005/8/layout/vList2"/>
     <dgm:cxn modelId="{92107A9A-666D-4CFB-B0D9-4977EEE77AF0}" type="presOf" srcId="{E998230F-99D9-435B-8C6C-696A930B37E4}" destId="{6C613A2A-6C83-4D32-A0C4-0FAB71AD5AAA}" srcOrd="0" destOrd="0" presId="urn:microsoft.com/office/officeart/2005/8/layout/vList2"/>
     <dgm:cxn modelId="{EC47BB61-DCF9-4FE1-A6E4-DCA07F708881}" srcId="{CFE4F7AC-4F2B-472A-8C89-A2C4CA510014}" destId="{7A23C5F4-0636-4C02-BE1F-C59C73E6A9AB}" srcOrd="2" destOrd="0" parTransId="{3B4DF9E8-B232-4C75-8963-241CC0F556EB}" sibTransId="{17FD8B4D-7EEB-409A-B52C-C1472638CCD3}"/>
+    <dgm:cxn modelId="{146360B6-875E-46D8-A090-2508E5081157}" type="presOf" srcId="{E5F76852-CF59-4796-97E9-1DEC1672D6DA}" destId="{DB829C1A-1324-4D6E-8480-917BED10E497}" srcOrd="0" destOrd="0" presId="urn:microsoft.com/office/officeart/2005/8/layout/vList2"/>
     <dgm:cxn modelId="{51861CB3-3E4E-48C7-AD28-8620CE7E7052}" type="presOf" srcId="{7F5559A7-7912-4E1A-B701-EF522B6229BC}" destId="{0530B477-2655-4DD8-8202-2C8C8C604F02}" srcOrd="0" destOrd="0" presId="urn:microsoft.com/office/officeart/2005/8/layout/vList2"/>
-    <dgm:cxn modelId="{146360B6-875E-46D8-A090-2508E5081157}" type="presOf" srcId="{E5F76852-CF59-4796-97E9-1DEC1672D6DA}" destId="{DB829C1A-1324-4D6E-8480-917BED10E497}" srcOrd="0" destOrd="0" presId="urn:microsoft.com/office/officeart/2005/8/layout/vList2"/>
     <dgm:cxn modelId="{40208715-0287-4B80-825B-EA2397E9C9CB}" srcId="{E5F76852-CF59-4796-97E9-1DEC1672D6DA}" destId="{8A0B6BCC-5488-4238-9BC5-DDCB51F9CD8A}" srcOrd="3" destOrd="0" parTransId="{7CBAD69C-C452-4DE2-BF31-8E9EDCD73548}" sibTransId="{394BFE77-54B0-45E8-806E-E3A1E2D13C96}"/>
     <dgm:cxn modelId="{6FD5B13A-E0C3-4DBB-A43E-276013FA5276}" srcId="{E998230F-99D9-435B-8C6C-696A930B37E4}" destId="{60B354F4-E0E9-4ACB-809B-4E97E3A5F7F4}" srcOrd="2" destOrd="0" parTransId="{3D06AF7E-FDDB-4C47-B64F-050744C56BB0}" sibTransId="{A535B62B-3D50-4F08-922E-89BB3643FCAD}"/>
     <dgm:cxn modelId="{2EF138AF-2466-40D4-B5EA-1A9FCD2FD86C}" type="presOf" srcId="{B8D79EC3-D690-4B98-8432-D763CFE24F85}" destId="{038A3218-D924-4E0F-B106-63B5EE221AC4}" srcOrd="0" destOrd="0" presId="urn:microsoft.com/office/officeart/2005/8/layout/vList2"/>
     <dgm:cxn modelId="{C7C8EBF8-508B-4C5E-901B-AB18FE608ADB}" srcId="{E5F76852-CF59-4796-97E9-1DEC1672D6DA}" destId="{7F5559A7-7912-4E1A-B701-EF522B6229BC}" srcOrd="0" destOrd="0" parTransId="{14EEB626-6297-4792-BF56-AE91F621CD34}" sibTransId="{931AA3A2-4E1F-4015-B219-1BE6D3D68F19}"/>
     <dgm:cxn modelId="{1393285D-5A88-4681-84CD-9B8C94443867}" srcId="{E998230F-99D9-435B-8C6C-696A930B37E4}" destId="{A9DC048D-A0BD-4CA2-836C-8AD5D711E713}" srcOrd="0" destOrd="0" parTransId="{1B42BEAA-B6B8-46B0-A024-E71B0C0A8345}" sibTransId="{BA9B6629-AD6C-4EA7-9804-07BE2C8DA76C}"/>
+    <dgm:cxn modelId="{EAE6DDFC-5641-47BC-B93A-DAD47F16F14E}" type="presOf" srcId="{CE356A93-15BE-4B91-A491-4D5727DB6329}" destId="{B5DCC8EC-DC92-4DDC-A601-F883943642EA}" srcOrd="0" destOrd="0" presId="urn:microsoft.com/office/officeart/2005/8/layout/vList2"/>
     <dgm:cxn modelId="{AAE4F25B-9998-4DC5-9389-B79C1BE7497E}" type="presOf" srcId="{4A714CE0-0FDB-4493-B328-248F29D38F60}" destId="{0530B477-2655-4DD8-8202-2C8C8C604F02}" srcOrd="0" destOrd="1" presId="urn:microsoft.com/office/officeart/2005/8/layout/vList2"/>
-    <dgm:cxn modelId="{EAE6DDFC-5641-47BC-B93A-DAD47F16F14E}" type="presOf" srcId="{CE356A93-15BE-4B91-A491-4D5727DB6329}" destId="{B5DCC8EC-DC92-4DDC-A601-F883943642EA}" srcOrd="0" destOrd="0" presId="urn:microsoft.com/office/officeart/2005/8/layout/vList2"/>
     <dgm:cxn modelId="{E087B482-B462-4329-81B9-04A2ED4EEF6C}" srcId="{E5F76852-CF59-4796-97E9-1DEC1672D6DA}" destId="{8D431C77-38B3-4D0F-928A-07333D2AE07F}" srcOrd="2" destOrd="0" parTransId="{96CEEE71-BA5E-4BA5-B3FD-24F8E2E41ADC}" sibTransId="{6DDE85CD-BBA4-4FC5-BA4A-4577618EC847}"/>
     <dgm:cxn modelId="{3CE9FF51-A6B8-4F19-8709-7DEF3763D57F}" type="presOf" srcId="{8A0B6BCC-5488-4238-9BC5-DDCB51F9CD8A}" destId="{0530B477-2655-4DD8-8202-2C8C8C604F02}" srcOrd="0" destOrd="3" presId="urn:microsoft.com/office/officeart/2005/8/layout/vList2"/>
     <dgm:cxn modelId="{50B7762B-CBBD-4F2B-AEF2-1838ADD1D978}" srcId="{CE356A93-15BE-4B91-A491-4D5727DB6329}" destId="{E998230F-99D9-435B-8C6C-696A930B37E4}" srcOrd="0" destOrd="0" parTransId="{FA4314EE-B75E-4B1A-97F0-255BCBDE2F70}" sibTransId="{858C5A1F-D120-46B4-9225-AA79639A6F91}"/>
@@ -2703,621 +2699,6 @@
       <dsp:cNvGrpSpPr/>
     </dsp:nvGrpSpPr>
     <dsp:grpSpPr/>
-    <dsp:sp modelId="{6C613A2A-6C83-4D32-A0C4-0FAB71AD5AAA}">
-      <dsp:nvSpPr>
-        <dsp:cNvPr id="0" name=""/>
-        <dsp:cNvSpPr/>
-      </dsp:nvSpPr>
-      <dsp:spPr>
-        <a:xfrm>
-          <a:off x="0" y="50433"/>
-          <a:ext cx="7344816" cy="491399"/>
-        </a:xfrm>
-        <a:prstGeom prst="roundRect">
-          <a:avLst/>
-        </a:prstGeom>
-        <a:gradFill rotWithShape="0">
-          <a:gsLst>
-            <a:gs pos="0">
-              <a:schemeClr val="accent1">
-                <a:hueOff val="0"/>
-                <a:satOff val="0"/>
-                <a:lumOff val="0"/>
-                <a:alphaOff val="0"/>
-                <a:tint val="96000"/>
-                <a:lumMod val="100000"/>
-              </a:schemeClr>
-            </a:gs>
-            <a:gs pos="78000">
-              <a:schemeClr val="accent1">
-                <a:hueOff val="0"/>
-                <a:satOff val="0"/>
-                <a:lumOff val="0"/>
-                <a:alphaOff val="0"/>
-                <a:shade val="94000"/>
-                <a:lumMod val="94000"/>
-              </a:schemeClr>
-            </a:gs>
-          </a:gsLst>
-          <a:lin ang="5400000" scaled="0"/>
-        </a:gradFill>
-        <a:ln>
-          <a:noFill/>
-        </a:ln>
-        <a:effectLst>
-          <a:outerShdw blurRad="50800" dist="38100" dir="5400000" rotWithShape="0">
-            <a:srgbClr val="000000">
-              <a:alpha val="35000"/>
-            </a:srgbClr>
-          </a:outerShdw>
-        </a:effectLst>
-        <a:scene3d>
-          <a:camera prst="orthographicFront">
-            <a:rot lat="0" lon="0" rev="0"/>
-          </a:camera>
-          <a:lightRig rig="threePt" dir="tl"/>
-        </a:scene3d>
-        <a:sp3d prstMaterial="plastic">
-          <a:bevelT w="0" h="0"/>
-        </a:sp3d>
-      </dsp:spPr>
-      <dsp:style>
-        <a:lnRef idx="0">
-          <a:scrgbClr r="0" g="0" b="0"/>
-        </a:lnRef>
-        <a:fillRef idx="3">
-          <a:scrgbClr r="0" g="0" b="0"/>
-        </a:fillRef>
-        <a:effectRef idx="3">
-          <a:scrgbClr r="0" g="0" b="0"/>
-        </a:effectRef>
-        <a:fontRef idx="minor">
-          <a:schemeClr val="lt1"/>
-        </a:fontRef>
-      </dsp:style>
-      <dsp:txBody>
-        <a:bodyPr spcFirstLastPara="0" vert="horz" wrap="square" lIns="80010" tIns="80010" rIns="80010" bIns="80010" numCol="1" spcCol="1270" anchor="ctr" anchorCtr="0">
-          <a:noAutofit/>
-        </a:bodyPr>
-        <a:lstStyle/>
-        <a:p>
-          <a:pPr lvl="0" algn="l" defTabSz="933450">
-            <a:lnSpc>
-              <a:spcPct val="90000"/>
-            </a:lnSpc>
-            <a:spcBef>
-              <a:spcPct val="0"/>
-            </a:spcBef>
-            <a:spcAft>
-              <a:spcPct val="35000"/>
-            </a:spcAft>
-          </a:pPr>
-          <a:r>
-            <a:rPr lang="fr-FR" sz="2100" kern="1200" dirty="0" smtClean="0"/>
-            <a:t>Introduction</a:t>
-          </a:r>
-          <a:endParaRPr lang="fr-FR" sz="2100" kern="1200" dirty="0"/>
-        </a:p>
-      </dsp:txBody>
-      <dsp:txXfrm>
-        <a:off x="23988" y="74421"/>
-        <a:ext cx="7296840" cy="443423"/>
-      </dsp:txXfrm>
-    </dsp:sp>
-    <dsp:sp modelId="{8360DFC4-69CA-4835-9D1A-F47FDB6123C0}">
-      <dsp:nvSpPr>
-        <dsp:cNvPr id="0" name=""/>
-        <dsp:cNvSpPr/>
-      </dsp:nvSpPr>
-      <dsp:spPr>
-        <a:xfrm>
-          <a:off x="0" y="541833"/>
-          <a:ext cx="7344816" cy="804194"/>
-        </a:xfrm>
-        <a:prstGeom prst="rect">
-          <a:avLst/>
-        </a:prstGeom>
-        <a:noFill/>
-        <a:ln>
-          <a:noFill/>
-        </a:ln>
-        <a:effectLst/>
-      </dsp:spPr>
-      <dsp:style>
-        <a:lnRef idx="0">
-          <a:scrgbClr r="0" g="0" b="0"/>
-        </a:lnRef>
-        <a:fillRef idx="0">
-          <a:scrgbClr r="0" g="0" b="0"/>
-        </a:fillRef>
-        <a:effectRef idx="0">
-          <a:scrgbClr r="0" g="0" b="0"/>
-        </a:effectRef>
-        <a:fontRef idx="minor"/>
-      </dsp:style>
-      <dsp:txBody>
-        <a:bodyPr spcFirstLastPara="0" vert="horz" wrap="square" lIns="233198" tIns="26670" rIns="149352" bIns="26670" numCol="1" spcCol="1270" anchor="t" anchorCtr="0">
-          <a:noAutofit/>
-        </a:bodyPr>
-        <a:lstStyle/>
-        <a:p>
-          <a:pPr marL="171450" lvl="1" indent="-171450" algn="l" defTabSz="711200">
-            <a:lnSpc>
-              <a:spcPct val="90000"/>
-            </a:lnSpc>
-            <a:spcBef>
-              <a:spcPct val="0"/>
-            </a:spcBef>
-            <a:spcAft>
-              <a:spcPct val="20000"/>
-            </a:spcAft>
-            <a:buChar char="••"/>
-          </a:pPr>
-          <a:r>
-            <a:rPr lang="fr-FR" sz="1600" kern="1200" dirty="0" smtClean="0"/>
-            <a:t>Présentation de l’équipe</a:t>
-          </a:r>
-          <a:endParaRPr lang="fr-FR" sz="1600" kern="1200" dirty="0"/>
-        </a:p>
-        <a:p>
-          <a:pPr marL="171450" lvl="1" indent="-171450" algn="l" defTabSz="711200">
-            <a:lnSpc>
-              <a:spcPct val="90000"/>
-            </a:lnSpc>
-            <a:spcBef>
-              <a:spcPct val="0"/>
-            </a:spcBef>
-            <a:spcAft>
-              <a:spcPct val="20000"/>
-            </a:spcAft>
-            <a:buChar char="••"/>
-          </a:pPr>
-          <a:r>
-            <a:rPr lang="fr-FR" sz="1600" kern="1200" dirty="0" smtClean="0"/>
-            <a:t>Présentation du projet</a:t>
-          </a:r>
-          <a:endParaRPr lang="fr-FR" sz="1600" kern="1200" dirty="0"/>
-        </a:p>
-        <a:p>
-          <a:pPr marL="171450" lvl="1" indent="-171450" algn="l" defTabSz="711200">
-            <a:lnSpc>
-              <a:spcPct val="90000"/>
-            </a:lnSpc>
-            <a:spcBef>
-              <a:spcPct val="0"/>
-            </a:spcBef>
-            <a:spcAft>
-              <a:spcPct val="20000"/>
-            </a:spcAft>
-            <a:buChar char="••"/>
-          </a:pPr>
-          <a:endParaRPr lang="fr-FR" sz="1600" kern="1200" dirty="0"/>
-        </a:p>
-      </dsp:txBody>
-      <dsp:txXfrm>
-        <a:off x="0" y="541833"/>
-        <a:ext cx="7344816" cy="804194"/>
-      </dsp:txXfrm>
-    </dsp:sp>
-    <dsp:sp modelId="{069AAD42-5E49-4B02-AA3B-94FAB2E79C39}">
-      <dsp:nvSpPr>
-        <dsp:cNvPr id="0" name=""/>
-        <dsp:cNvSpPr/>
-      </dsp:nvSpPr>
-      <dsp:spPr>
-        <a:xfrm>
-          <a:off x="0" y="1219617"/>
-          <a:ext cx="7344816" cy="491399"/>
-        </a:xfrm>
-        <a:prstGeom prst="roundRect">
-          <a:avLst/>
-        </a:prstGeom>
-        <a:gradFill rotWithShape="0">
-          <a:gsLst>
-            <a:gs pos="0">
-              <a:schemeClr val="accent1">
-                <a:hueOff val="0"/>
-                <a:satOff val="0"/>
-                <a:lumOff val="0"/>
-                <a:alphaOff val="0"/>
-                <a:tint val="96000"/>
-                <a:lumMod val="100000"/>
-              </a:schemeClr>
-            </a:gs>
-            <a:gs pos="78000">
-              <a:schemeClr val="accent1">
-                <a:hueOff val="0"/>
-                <a:satOff val="0"/>
-                <a:lumOff val="0"/>
-                <a:alphaOff val="0"/>
-                <a:shade val="94000"/>
-                <a:lumMod val="94000"/>
-              </a:schemeClr>
-            </a:gs>
-          </a:gsLst>
-          <a:lin ang="5400000" scaled="0"/>
-        </a:gradFill>
-        <a:ln>
-          <a:noFill/>
-        </a:ln>
-        <a:effectLst>
-          <a:outerShdw blurRad="50800" dist="38100" dir="5400000" rotWithShape="0">
-            <a:srgbClr val="000000">
-              <a:alpha val="35000"/>
-            </a:srgbClr>
-          </a:outerShdw>
-        </a:effectLst>
-        <a:scene3d>
-          <a:camera prst="orthographicFront">
-            <a:rot lat="0" lon="0" rev="0"/>
-          </a:camera>
-          <a:lightRig rig="threePt" dir="tl"/>
-        </a:scene3d>
-        <a:sp3d prstMaterial="plastic">
-          <a:bevelT w="0" h="0"/>
-        </a:sp3d>
-      </dsp:spPr>
-      <dsp:style>
-        <a:lnRef idx="0">
-          <a:scrgbClr r="0" g="0" b="0"/>
-        </a:lnRef>
-        <a:fillRef idx="3">
-          <a:scrgbClr r="0" g="0" b="0"/>
-        </a:fillRef>
-        <a:effectRef idx="3">
-          <a:scrgbClr r="0" g="0" b="0"/>
-        </a:effectRef>
-        <a:fontRef idx="minor">
-          <a:schemeClr val="lt1"/>
-        </a:fontRef>
-      </dsp:style>
-      <dsp:txBody>
-        <a:bodyPr spcFirstLastPara="0" vert="horz" wrap="square" lIns="80010" tIns="80010" rIns="80010" bIns="80010" numCol="1" spcCol="1270" anchor="ctr" anchorCtr="0">
-          <a:noAutofit/>
-        </a:bodyPr>
-        <a:lstStyle/>
-        <a:p>
-          <a:pPr lvl="0" algn="l" defTabSz="933450">
-            <a:lnSpc>
-              <a:spcPct val="90000"/>
-            </a:lnSpc>
-            <a:spcBef>
-              <a:spcPct val="0"/>
-            </a:spcBef>
-            <a:spcAft>
-              <a:spcPct val="35000"/>
-            </a:spcAft>
-          </a:pPr>
-          <a:r>
-            <a:rPr lang="fr-FR" sz="2100" kern="1200" dirty="0" smtClean="0"/>
-            <a:t>Travail réalisé</a:t>
-          </a:r>
-          <a:endParaRPr lang="fr-FR" sz="2100" kern="1200" dirty="0"/>
-        </a:p>
-      </dsp:txBody>
-      <dsp:txXfrm>
-        <a:off x="23988" y="1243605"/>
-        <a:ext cx="7296840" cy="443423"/>
-      </dsp:txXfrm>
-    </dsp:sp>
-    <dsp:sp modelId="{038A3218-D924-4E0F-B106-63B5EE221AC4}">
-      <dsp:nvSpPr>
-        <dsp:cNvPr id="0" name=""/>
-        <dsp:cNvSpPr/>
-      </dsp:nvSpPr>
-      <dsp:spPr>
-        <a:xfrm>
-          <a:off x="0" y="1837428"/>
-          <a:ext cx="7344816" cy="804194"/>
-        </a:xfrm>
-        <a:prstGeom prst="rect">
-          <a:avLst/>
-        </a:prstGeom>
-        <a:noFill/>
-        <a:ln>
-          <a:noFill/>
-        </a:ln>
-        <a:effectLst/>
-      </dsp:spPr>
-      <dsp:style>
-        <a:lnRef idx="0">
-          <a:scrgbClr r="0" g="0" b="0"/>
-        </a:lnRef>
-        <a:fillRef idx="0">
-          <a:scrgbClr r="0" g="0" b="0"/>
-        </a:fillRef>
-        <a:effectRef idx="0">
-          <a:scrgbClr r="0" g="0" b="0"/>
-        </a:effectRef>
-        <a:fontRef idx="minor"/>
-      </dsp:style>
-      <dsp:txBody>
-        <a:bodyPr spcFirstLastPara="0" vert="horz" wrap="square" lIns="233198" tIns="26670" rIns="149352" bIns="26670" numCol="1" spcCol="1270" anchor="t" anchorCtr="0">
-          <a:noAutofit/>
-        </a:bodyPr>
-        <a:lstStyle/>
-        <a:p>
-          <a:pPr marL="171450" lvl="1" indent="-171450" algn="l" defTabSz="711200">
-            <a:lnSpc>
-              <a:spcPct val="90000"/>
-            </a:lnSpc>
-            <a:spcBef>
-              <a:spcPct val="0"/>
-            </a:spcBef>
-            <a:spcAft>
-              <a:spcPct val="20000"/>
-            </a:spcAft>
-            <a:buChar char="••"/>
-          </a:pPr>
-          <a:r>
-            <a:rPr lang="fr-FR" sz="1600" kern="1200" dirty="0" smtClean="0"/>
-            <a:t>Planning</a:t>
-          </a:r>
-          <a:endParaRPr lang="fr-FR" sz="1600" kern="1200" dirty="0"/>
-        </a:p>
-        <a:p>
-          <a:pPr marL="171450" lvl="1" indent="-171450" algn="l" defTabSz="711200">
-            <a:lnSpc>
-              <a:spcPct val="90000"/>
-            </a:lnSpc>
-            <a:spcBef>
-              <a:spcPct val="0"/>
-            </a:spcBef>
-            <a:spcAft>
-              <a:spcPct val="20000"/>
-            </a:spcAft>
-            <a:buChar char="••"/>
-          </a:pPr>
-          <a:r>
-            <a:rPr lang="fr-FR" sz="1600" kern="1200" dirty="0" smtClean="0"/>
-            <a:t>Démonstration</a:t>
-          </a:r>
-          <a:endParaRPr lang="fr-FR" sz="1600" kern="1200" dirty="0"/>
-        </a:p>
-        <a:p>
-          <a:pPr marL="171450" lvl="1" indent="-171450" algn="l" defTabSz="711200">
-            <a:lnSpc>
-              <a:spcPct val="90000"/>
-            </a:lnSpc>
-            <a:spcBef>
-              <a:spcPct val="0"/>
-            </a:spcBef>
-            <a:spcAft>
-              <a:spcPct val="20000"/>
-            </a:spcAft>
-            <a:buChar char="••"/>
-          </a:pPr>
-          <a:endParaRPr lang="fr-FR" sz="1600" kern="1200" dirty="0"/>
-        </a:p>
-      </dsp:txBody>
-      <dsp:txXfrm>
-        <a:off x="0" y="1837428"/>
-        <a:ext cx="7344816" cy="804194"/>
-      </dsp:txXfrm>
-    </dsp:sp>
-    <dsp:sp modelId="{DB829C1A-1324-4D6E-8480-917BED10E497}">
-      <dsp:nvSpPr>
-        <dsp:cNvPr id="0" name=""/>
-        <dsp:cNvSpPr/>
-      </dsp:nvSpPr>
-      <dsp:spPr>
-        <a:xfrm>
-          <a:off x="0" y="2641623"/>
-          <a:ext cx="7344816" cy="491399"/>
-        </a:xfrm>
-        <a:prstGeom prst="roundRect">
-          <a:avLst/>
-        </a:prstGeom>
-        <a:gradFill rotWithShape="0">
-          <a:gsLst>
-            <a:gs pos="0">
-              <a:schemeClr val="accent1">
-                <a:hueOff val="0"/>
-                <a:satOff val="0"/>
-                <a:lumOff val="0"/>
-                <a:alphaOff val="0"/>
-                <a:tint val="96000"/>
-                <a:lumMod val="100000"/>
-              </a:schemeClr>
-            </a:gs>
-            <a:gs pos="78000">
-              <a:schemeClr val="accent1">
-                <a:hueOff val="0"/>
-                <a:satOff val="0"/>
-                <a:lumOff val="0"/>
-                <a:alphaOff val="0"/>
-                <a:shade val="94000"/>
-                <a:lumMod val="94000"/>
-              </a:schemeClr>
-            </a:gs>
-          </a:gsLst>
-          <a:lin ang="5400000" scaled="0"/>
-        </a:gradFill>
-        <a:ln>
-          <a:noFill/>
-        </a:ln>
-        <a:effectLst>
-          <a:outerShdw blurRad="50800" dist="38100" dir="5400000" rotWithShape="0">
-            <a:srgbClr val="000000">
-              <a:alpha val="35000"/>
-            </a:srgbClr>
-          </a:outerShdw>
-        </a:effectLst>
-        <a:scene3d>
-          <a:camera prst="orthographicFront">
-            <a:rot lat="0" lon="0" rev="0"/>
-          </a:camera>
-          <a:lightRig rig="threePt" dir="tl"/>
-        </a:scene3d>
-        <a:sp3d prstMaterial="plastic">
-          <a:bevelT w="0" h="0"/>
-        </a:sp3d>
-      </dsp:spPr>
-      <dsp:style>
-        <a:lnRef idx="0">
-          <a:scrgbClr r="0" g="0" b="0"/>
-        </a:lnRef>
-        <a:fillRef idx="3">
-          <a:scrgbClr r="0" g="0" b="0"/>
-        </a:fillRef>
-        <a:effectRef idx="3">
-          <a:scrgbClr r="0" g="0" b="0"/>
-        </a:effectRef>
-        <a:fontRef idx="minor">
-          <a:schemeClr val="lt1"/>
-        </a:fontRef>
-      </dsp:style>
-      <dsp:txBody>
-        <a:bodyPr spcFirstLastPara="0" vert="horz" wrap="square" lIns="80010" tIns="80010" rIns="80010" bIns="80010" numCol="1" spcCol="1270" anchor="ctr" anchorCtr="0">
-          <a:noAutofit/>
-        </a:bodyPr>
-        <a:lstStyle/>
-        <a:p>
-          <a:pPr lvl="0" algn="l" defTabSz="933450">
-            <a:lnSpc>
-              <a:spcPct val="90000"/>
-            </a:lnSpc>
-            <a:spcBef>
-              <a:spcPct val="0"/>
-            </a:spcBef>
-            <a:spcAft>
-              <a:spcPct val="35000"/>
-            </a:spcAft>
-          </a:pPr>
-          <a:r>
-            <a:rPr lang="fr-FR" sz="2100" kern="1200" dirty="0" smtClean="0"/>
-            <a:t>Conclusion</a:t>
-          </a:r>
-          <a:endParaRPr lang="fr-FR" sz="2100" kern="1200" dirty="0"/>
-        </a:p>
-      </dsp:txBody>
-      <dsp:txXfrm>
-        <a:off x="23988" y="2665611"/>
-        <a:ext cx="7296840" cy="443423"/>
-      </dsp:txXfrm>
-    </dsp:sp>
-    <dsp:sp modelId="{0530B477-2655-4DD8-8202-2C8C8C604F02}">
-      <dsp:nvSpPr>
-        <dsp:cNvPr id="0" name=""/>
-        <dsp:cNvSpPr/>
-      </dsp:nvSpPr>
-      <dsp:spPr>
-        <a:xfrm>
-          <a:off x="0" y="3133023"/>
-          <a:ext cx="7344816" cy="1065015"/>
-        </a:xfrm>
-        <a:prstGeom prst="rect">
-          <a:avLst/>
-        </a:prstGeom>
-        <a:noFill/>
-        <a:ln>
-          <a:noFill/>
-        </a:ln>
-        <a:effectLst/>
-      </dsp:spPr>
-      <dsp:style>
-        <a:lnRef idx="0">
-          <a:scrgbClr r="0" g="0" b="0"/>
-        </a:lnRef>
-        <a:fillRef idx="0">
-          <a:scrgbClr r="0" g="0" b="0"/>
-        </a:fillRef>
-        <a:effectRef idx="0">
-          <a:scrgbClr r="0" g="0" b="0"/>
-        </a:effectRef>
-        <a:fontRef idx="minor"/>
-      </dsp:style>
-      <dsp:txBody>
-        <a:bodyPr spcFirstLastPara="0" vert="horz" wrap="square" lIns="233198" tIns="26670" rIns="149352" bIns="26670" numCol="1" spcCol="1270" anchor="t" anchorCtr="0">
-          <a:noAutofit/>
-        </a:bodyPr>
-        <a:lstStyle/>
-        <a:p>
-          <a:pPr marL="171450" lvl="1" indent="-171450" algn="l" defTabSz="711200">
-            <a:lnSpc>
-              <a:spcPct val="90000"/>
-            </a:lnSpc>
-            <a:spcBef>
-              <a:spcPct val="0"/>
-            </a:spcBef>
-            <a:spcAft>
-              <a:spcPct val="20000"/>
-            </a:spcAft>
-            <a:buChar char="••"/>
-          </a:pPr>
-          <a:r>
-            <a:rPr lang="fr-FR" sz="1600" kern="1200" dirty="0" smtClean="0"/>
-            <a:t>Points forts</a:t>
-          </a:r>
-          <a:endParaRPr lang="fr-FR" sz="1600" kern="1200" dirty="0"/>
-        </a:p>
-        <a:p>
-          <a:pPr marL="171450" lvl="1" indent="-171450" algn="l" defTabSz="711200">
-            <a:lnSpc>
-              <a:spcPct val="90000"/>
-            </a:lnSpc>
-            <a:spcBef>
-              <a:spcPct val="0"/>
-            </a:spcBef>
-            <a:spcAft>
-              <a:spcPct val="20000"/>
-            </a:spcAft>
-            <a:buChar char="••"/>
-          </a:pPr>
-          <a:r>
-            <a:rPr lang="fr-FR" sz="1600" kern="1200" dirty="0" smtClean="0"/>
-            <a:t>Perspectives </a:t>
-          </a:r>
-          <a:r>
-            <a:rPr lang="fr-FR" sz="1600" kern="1200" dirty="0" smtClean="0"/>
-            <a:t>d’évolution</a:t>
-          </a:r>
-          <a:endParaRPr lang="fr-FR" sz="1600" kern="1200" dirty="0"/>
-        </a:p>
-        <a:p>
-          <a:pPr marL="171450" lvl="1" indent="-171450" algn="l" defTabSz="711200">
-            <a:lnSpc>
-              <a:spcPct val="90000"/>
-            </a:lnSpc>
-            <a:spcBef>
-              <a:spcPct val="0"/>
-            </a:spcBef>
-            <a:spcAft>
-              <a:spcPct val="20000"/>
-            </a:spcAft>
-            <a:buChar char="••"/>
-          </a:pPr>
-          <a:r>
-            <a:rPr lang="fr-FR" sz="1600" kern="1200" dirty="0" smtClean="0"/>
-            <a:t>Bilan</a:t>
-          </a:r>
-          <a:endParaRPr lang="fr-FR" sz="1600" kern="1200" dirty="0"/>
-        </a:p>
-        <a:p>
-          <a:pPr marL="171450" lvl="1" indent="-171450" algn="l" defTabSz="711200">
-            <a:lnSpc>
-              <a:spcPct val="90000"/>
-            </a:lnSpc>
-            <a:spcBef>
-              <a:spcPct val="0"/>
-            </a:spcBef>
-            <a:spcAft>
-              <a:spcPct val="20000"/>
-            </a:spcAft>
-            <a:buChar char="••"/>
-          </a:pPr>
-          <a:r>
-            <a:rPr lang="fr-FR" sz="1600" kern="1200" dirty="0" smtClean="0"/>
-            <a:t>Conclusion</a:t>
-          </a:r>
-          <a:endParaRPr lang="fr-FR" sz="1600" kern="1200" dirty="0"/>
-        </a:p>
-      </dsp:txBody>
-      <dsp:txXfrm>
-        <a:off x="0" y="3133023"/>
-        <a:ext cx="7344816" cy="1065015"/>
-      </dsp:txXfrm>
-    </dsp:sp>
   </dsp:spTree>
 </dsp:drawing>
 </file>
@@ -3330,427 +2711,6 @@
       <dsp:cNvGrpSpPr/>
     </dsp:nvGrpSpPr>
     <dsp:grpSpPr/>
-    <dsp:sp modelId="{EDC967A1-A952-4850-8EF8-40949E34F7C6}">
-      <dsp:nvSpPr>
-        <dsp:cNvPr id="0" name=""/>
-        <dsp:cNvSpPr/>
-      </dsp:nvSpPr>
-      <dsp:spPr>
-        <a:xfrm>
-          <a:off x="0" y="333143"/>
-          <a:ext cx="6777037" cy="876487"/>
-        </a:xfrm>
-        <a:prstGeom prst="rect">
-          <a:avLst/>
-        </a:prstGeom>
-        <a:solidFill>
-          <a:schemeClr val="lt1">
-            <a:alpha val="90000"/>
-            <a:hueOff val="0"/>
-            <a:satOff val="0"/>
-            <a:lumOff val="0"/>
-            <a:alphaOff val="0"/>
-          </a:schemeClr>
-        </a:solidFill>
-        <a:ln w="12700" cap="rnd" cmpd="sng" algn="ctr">
-          <a:solidFill>
-            <a:schemeClr val="accent1">
-              <a:hueOff val="0"/>
-              <a:satOff val="0"/>
-              <a:lumOff val="0"/>
-              <a:alphaOff val="0"/>
-            </a:schemeClr>
-          </a:solidFill>
-          <a:prstDash val="solid"/>
-        </a:ln>
-        <a:effectLst>
-          <a:outerShdw blurRad="38100" dist="25400" dir="5400000" rotWithShape="0">
-            <a:srgbClr val="000000">
-              <a:alpha val="35000"/>
-            </a:srgbClr>
-          </a:outerShdw>
-        </a:effectLst>
-      </dsp:spPr>
-      <dsp:style>
-        <a:lnRef idx="1">
-          <a:scrgbClr r="0" g="0" b="0"/>
-        </a:lnRef>
-        <a:fillRef idx="1">
-          <a:scrgbClr r="0" g="0" b="0"/>
-        </a:fillRef>
-        <a:effectRef idx="2">
-          <a:scrgbClr r="0" g="0" b="0"/>
-        </a:effectRef>
-        <a:fontRef idx="minor"/>
-      </dsp:style>
-      <dsp:txBody>
-        <a:bodyPr spcFirstLastPara="0" vert="horz" wrap="square" lIns="525973" tIns="437388" rIns="525973" bIns="149352" numCol="1" spcCol="1270" anchor="t" anchorCtr="0">
-          <a:noAutofit/>
-        </a:bodyPr>
-        <a:lstStyle/>
-        <a:p>
-          <a:pPr marL="228600" lvl="1" indent="-228600" algn="l" defTabSz="933450">
-            <a:lnSpc>
-              <a:spcPct val="90000"/>
-            </a:lnSpc>
-            <a:spcBef>
-              <a:spcPct val="0"/>
-            </a:spcBef>
-            <a:spcAft>
-              <a:spcPct val="15000"/>
-            </a:spcAft>
-            <a:buChar char="••"/>
-          </a:pPr>
-          <a:r>
-            <a:rPr lang="fr-FR" sz="2100" kern="1200" dirty="0" smtClean="0"/>
-            <a:t>Benjamin BRAYE</a:t>
-          </a:r>
-          <a:endParaRPr lang="fr-FR" sz="2100" kern="1200" dirty="0"/>
-        </a:p>
-      </dsp:txBody>
-      <dsp:txXfrm>
-        <a:off x="0" y="333143"/>
-        <a:ext cx="6777037" cy="876487"/>
-      </dsp:txXfrm>
-    </dsp:sp>
-    <dsp:sp modelId="{46A8A9F3-1460-4DD5-A042-AA58CF8CC3C0}">
-      <dsp:nvSpPr>
-        <dsp:cNvPr id="0" name=""/>
-        <dsp:cNvSpPr/>
-      </dsp:nvSpPr>
-      <dsp:spPr>
-        <a:xfrm>
-          <a:off x="338851" y="23183"/>
-          <a:ext cx="4743925" cy="619920"/>
-        </a:xfrm>
-        <a:prstGeom prst="roundRect">
-          <a:avLst/>
-        </a:prstGeom>
-        <a:gradFill rotWithShape="0">
-          <a:gsLst>
-            <a:gs pos="0">
-              <a:schemeClr val="accent1">
-                <a:hueOff val="0"/>
-                <a:satOff val="0"/>
-                <a:lumOff val="0"/>
-                <a:alphaOff val="0"/>
-                <a:tint val="96000"/>
-                <a:lumMod val="100000"/>
-              </a:schemeClr>
-            </a:gs>
-            <a:gs pos="78000">
-              <a:schemeClr val="accent1">
-                <a:hueOff val="0"/>
-                <a:satOff val="0"/>
-                <a:lumOff val="0"/>
-                <a:alphaOff val="0"/>
-                <a:shade val="94000"/>
-                <a:lumMod val="94000"/>
-              </a:schemeClr>
-            </a:gs>
-          </a:gsLst>
-          <a:lin ang="5400000" scaled="0"/>
-        </a:gradFill>
-        <a:ln>
-          <a:noFill/>
-        </a:ln>
-        <a:effectLst>
-          <a:outerShdw blurRad="50800" dist="38100" dir="5400000" rotWithShape="0">
-            <a:srgbClr val="000000">
-              <a:alpha val="35000"/>
-            </a:srgbClr>
-          </a:outerShdw>
-        </a:effectLst>
-        <a:scene3d>
-          <a:camera prst="orthographicFront">
-            <a:rot lat="0" lon="0" rev="0"/>
-          </a:camera>
-          <a:lightRig rig="threePt" dir="tl"/>
-        </a:scene3d>
-        <a:sp3d prstMaterial="plastic">
-          <a:bevelT w="0" h="0"/>
-        </a:sp3d>
-      </dsp:spPr>
-      <dsp:style>
-        <a:lnRef idx="0">
-          <a:scrgbClr r="0" g="0" b="0"/>
-        </a:lnRef>
-        <a:fillRef idx="3">
-          <a:scrgbClr r="0" g="0" b="0"/>
-        </a:fillRef>
-        <a:effectRef idx="3">
-          <a:scrgbClr r="0" g="0" b="0"/>
-        </a:effectRef>
-        <a:fontRef idx="minor">
-          <a:schemeClr val="lt1"/>
-        </a:fontRef>
-      </dsp:style>
-      <dsp:txBody>
-        <a:bodyPr spcFirstLastPara="0" vert="horz" wrap="square" lIns="179309" tIns="0" rIns="179309" bIns="0" numCol="1" spcCol="1270" anchor="ctr" anchorCtr="0">
-          <a:noAutofit/>
-        </a:bodyPr>
-        <a:lstStyle/>
-        <a:p>
-          <a:pPr lvl="0" algn="l" defTabSz="933450">
-            <a:lnSpc>
-              <a:spcPct val="90000"/>
-            </a:lnSpc>
-            <a:spcBef>
-              <a:spcPct val="0"/>
-            </a:spcBef>
-            <a:spcAft>
-              <a:spcPct val="35000"/>
-            </a:spcAft>
-          </a:pPr>
-          <a:r>
-            <a:rPr lang="fr-FR" sz="2100" kern="1200" dirty="0" smtClean="0"/>
-            <a:t>Chef de projet</a:t>
-          </a:r>
-          <a:endParaRPr lang="fr-FR" sz="2100" kern="1200" dirty="0"/>
-        </a:p>
-      </dsp:txBody>
-      <dsp:txXfrm>
-        <a:off x="369113" y="53445"/>
-        <a:ext cx="4683401" cy="559396"/>
-      </dsp:txXfrm>
-    </dsp:sp>
-    <dsp:sp modelId="{3AF7F569-1D0D-4E1D-AFED-38E8A06A1015}">
-      <dsp:nvSpPr>
-        <dsp:cNvPr id="0" name=""/>
-        <dsp:cNvSpPr/>
-      </dsp:nvSpPr>
-      <dsp:spPr>
-        <a:xfrm>
-          <a:off x="0" y="1632991"/>
-          <a:ext cx="6777037" cy="1852200"/>
-        </a:xfrm>
-        <a:prstGeom prst="rect">
-          <a:avLst/>
-        </a:prstGeom>
-        <a:solidFill>
-          <a:schemeClr val="lt1">
-            <a:alpha val="90000"/>
-            <a:hueOff val="0"/>
-            <a:satOff val="0"/>
-            <a:lumOff val="0"/>
-            <a:alphaOff val="0"/>
-          </a:schemeClr>
-        </a:solidFill>
-        <a:ln w="12700" cap="rnd" cmpd="sng" algn="ctr">
-          <a:solidFill>
-            <a:schemeClr val="accent1">
-              <a:hueOff val="0"/>
-              <a:satOff val="0"/>
-              <a:lumOff val="0"/>
-              <a:alphaOff val="0"/>
-            </a:schemeClr>
-          </a:solidFill>
-          <a:prstDash val="solid"/>
-        </a:ln>
-        <a:effectLst>
-          <a:outerShdw blurRad="38100" dist="25400" dir="5400000" rotWithShape="0">
-            <a:srgbClr val="000000">
-              <a:alpha val="35000"/>
-            </a:srgbClr>
-          </a:outerShdw>
-        </a:effectLst>
-      </dsp:spPr>
-      <dsp:style>
-        <a:lnRef idx="1">
-          <a:scrgbClr r="0" g="0" b="0"/>
-        </a:lnRef>
-        <a:fillRef idx="1">
-          <a:scrgbClr r="0" g="0" b="0"/>
-        </a:fillRef>
-        <a:effectRef idx="2">
-          <a:scrgbClr r="0" g="0" b="0"/>
-        </a:effectRef>
-        <a:fontRef idx="minor"/>
-      </dsp:style>
-      <dsp:txBody>
-        <a:bodyPr spcFirstLastPara="0" vert="horz" wrap="square" lIns="525973" tIns="437388" rIns="525973" bIns="149352" numCol="1" spcCol="1270" anchor="t" anchorCtr="0">
-          <a:noAutofit/>
-        </a:bodyPr>
-        <a:lstStyle/>
-        <a:p>
-          <a:pPr marL="228600" lvl="1" indent="-228600" algn="l" defTabSz="933450">
-            <a:lnSpc>
-              <a:spcPct val="90000"/>
-            </a:lnSpc>
-            <a:spcBef>
-              <a:spcPct val="0"/>
-            </a:spcBef>
-            <a:spcAft>
-              <a:spcPct val="15000"/>
-            </a:spcAft>
-            <a:buChar char="••"/>
-          </a:pPr>
-          <a:r>
-            <a:rPr lang="fr-FR" sz="2100" kern="1200" dirty="0" smtClean="0"/>
-            <a:t>Antoine-Ali ZARROUK</a:t>
-          </a:r>
-          <a:endParaRPr lang="fr-FR" sz="2100" kern="1200" dirty="0"/>
-        </a:p>
-        <a:p>
-          <a:pPr marL="228600" lvl="1" indent="-228600" algn="l" defTabSz="933450">
-            <a:lnSpc>
-              <a:spcPct val="90000"/>
-            </a:lnSpc>
-            <a:spcBef>
-              <a:spcPct val="0"/>
-            </a:spcBef>
-            <a:spcAft>
-              <a:spcPct val="15000"/>
-            </a:spcAft>
-            <a:buChar char="••"/>
-          </a:pPr>
-          <a:r>
-            <a:rPr lang="fr-FR" sz="2100" kern="1200" dirty="0" smtClean="0"/>
-            <a:t>Gwilherm BERNARD</a:t>
-          </a:r>
-          <a:endParaRPr lang="fr-FR" sz="2100" kern="1200" dirty="0"/>
-        </a:p>
-        <a:p>
-          <a:pPr marL="228600" lvl="1" indent="-228600" algn="l" defTabSz="933450">
-            <a:lnSpc>
-              <a:spcPct val="90000"/>
-            </a:lnSpc>
-            <a:spcBef>
-              <a:spcPct val="0"/>
-            </a:spcBef>
-            <a:spcAft>
-              <a:spcPct val="15000"/>
-            </a:spcAft>
-            <a:buChar char="••"/>
-          </a:pPr>
-          <a:r>
-            <a:rPr lang="fr-FR" sz="2100" kern="1200" dirty="0" smtClean="0"/>
-            <a:t>Arnaud GRASTIEN</a:t>
-          </a:r>
-          <a:endParaRPr lang="fr-FR" sz="2100" kern="1200" dirty="0"/>
-        </a:p>
-        <a:p>
-          <a:pPr marL="228600" lvl="1" indent="-228600" algn="l" defTabSz="933450">
-            <a:lnSpc>
-              <a:spcPct val="90000"/>
-            </a:lnSpc>
-            <a:spcBef>
-              <a:spcPct val="0"/>
-            </a:spcBef>
-            <a:spcAft>
-              <a:spcPct val="15000"/>
-            </a:spcAft>
-            <a:buChar char="••"/>
-          </a:pPr>
-          <a:endParaRPr lang="fr-FR" sz="2100" kern="1200" dirty="0"/>
-        </a:p>
-      </dsp:txBody>
-      <dsp:txXfrm>
-        <a:off x="0" y="1632991"/>
-        <a:ext cx="6777037" cy="1852200"/>
-      </dsp:txXfrm>
-    </dsp:sp>
-    <dsp:sp modelId="{C9E3062B-D232-44DB-A8B8-C4290E87B5B2}">
-      <dsp:nvSpPr>
-        <dsp:cNvPr id="0" name=""/>
-        <dsp:cNvSpPr/>
-      </dsp:nvSpPr>
-      <dsp:spPr>
-        <a:xfrm>
-          <a:off x="338851" y="1323031"/>
-          <a:ext cx="4743925" cy="619920"/>
-        </a:xfrm>
-        <a:prstGeom prst="roundRect">
-          <a:avLst/>
-        </a:prstGeom>
-        <a:gradFill rotWithShape="0">
-          <a:gsLst>
-            <a:gs pos="0">
-              <a:schemeClr val="accent1">
-                <a:hueOff val="0"/>
-                <a:satOff val="0"/>
-                <a:lumOff val="0"/>
-                <a:alphaOff val="0"/>
-                <a:tint val="96000"/>
-                <a:lumMod val="100000"/>
-              </a:schemeClr>
-            </a:gs>
-            <a:gs pos="78000">
-              <a:schemeClr val="accent1">
-                <a:hueOff val="0"/>
-                <a:satOff val="0"/>
-                <a:lumOff val="0"/>
-                <a:alphaOff val="0"/>
-                <a:shade val="94000"/>
-                <a:lumMod val="94000"/>
-              </a:schemeClr>
-            </a:gs>
-          </a:gsLst>
-          <a:lin ang="5400000" scaled="0"/>
-        </a:gradFill>
-        <a:ln>
-          <a:noFill/>
-        </a:ln>
-        <a:effectLst>
-          <a:outerShdw blurRad="50800" dist="38100" dir="5400000" rotWithShape="0">
-            <a:srgbClr val="000000">
-              <a:alpha val="35000"/>
-            </a:srgbClr>
-          </a:outerShdw>
-        </a:effectLst>
-        <a:scene3d>
-          <a:camera prst="orthographicFront">
-            <a:rot lat="0" lon="0" rev="0"/>
-          </a:camera>
-          <a:lightRig rig="threePt" dir="tl"/>
-        </a:scene3d>
-        <a:sp3d prstMaterial="plastic">
-          <a:bevelT w="0" h="0"/>
-        </a:sp3d>
-      </dsp:spPr>
-      <dsp:style>
-        <a:lnRef idx="0">
-          <a:scrgbClr r="0" g="0" b="0"/>
-        </a:lnRef>
-        <a:fillRef idx="3">
-          <a:scrgbClr r="0" g="0" b="0"/>
-        </a:fillRef>
-        <a:effectRef idx="3">
-          <a:scrgbClr r="0" g="0" b="0"/>
-        </a:effectRef>
-        <a:fontRef idx="minor">
-          <a:schemeClr val="lt1"/>
-        </a:fontRef>
-      </dsp:style>
-      <dsp:txBody>
-        <a:bodyPr spcFirstLastPara="0" vert="horz" wrap="square" lIns="179309" tIns="0" rIns="179309" bIns="0" numCol="1" spcCol="1270" anchor="ctr" anchorCtr="0">
-          <a:noAutofit/>
-        </a:bodyPr>
-        <a:lstStyle/>
-        <a:p>
-          <a:pPr lvl="0" algn="l" defTabSz="933450">
-            <a:lnSpc>
-              <a:spcPct val="90000"/>
-            </a:lnSpc>
-            <a:spcBef>
-              <a:spcPct val="0"/>
-            </a:spcBef>
-            <a:spcAft>
-              <a:spcPct val="35000"/>
-            </a:spcAft>
-          </a:pPr>
-          <a:r>
-            <a:rPr lang="fr-FR" sz="2100" kern="1200" dirty="0" smtClean="0"/>
-            <a:t>Développeurs</a:t>
-          </a:r>
-          <a:endParaRPr lang="fr-FR" sz="2100" kern="1200" dirty="0"/>
-        </a:p>
-      </dsp:txBody>
-      <dsp:txXfrm>
-        <a:off x="369113" y="1353293"/>
-        <a:ext cx="4683401" cy="559396"/>
-      </dsp:txXfrm>
-    </dsp:sp>
   </dsp:spTree>
 </dsp:drawing>
 </file>
@@ -12564,23 +11524,7 @@
                   <a:srgbClr val="467822"/>
                 </a:solidFill>
               </a:rPr>
-              <a:t>« Nous </a:t>
-            </a:r>
-            <a:r>
-              <a:rPr lang="fr-FR" sz="2400" dirty="0" smtClean="0">
-                <a:solidFill>
-                  <a:srgbClr val="467822"/>
-                </a:solidFill>
-              </a:rPr>
-              <a:t>sommes prêts à </a:t>
-            </a:r>
-            <a:r>
-              <a:rPr lang="fr-FR" sz="2400" dirty="0" smtClean="0">
-                <a:solidFill>
-                  <a:srgbClr val="467822"/>
-                </a:solidFill>
-              </a:rPr>
-              <a:t>répondre à vos questions… »</a:t>
+              <a:t>« Nous sommes prêts à répondre à vos questions… »</a:t>
             </a:r>
             <a:endParaRPr lang="fr-FR" sz="2400" dirty="0">
               <a:solidFill>
@@ -13378,15 +12322,7 @@
             </a:r>
             <a:r>
               <a:rPr lang="fr-FR" sz="1200" dirty="0" smtClean="0"/>
-              <a:t> – Travail </a:t>
-            </a:r>
-            <a:r>
-              <a:rPr lang="fr-FR" sz="1200" dirty="0" smtClean="0"/>
-              <a:t>effectué </a:t>
-            </a:r>
-            <a:r>
-              <a:rPr lang="fr-FR" sz="1200" dirty="0" smtClean="0"/>
-              <a:t>- Conclusion</a:t>
+              <a:t> – Travail effectué - Conclusion</a:t>
             </a:r>
             <a:endParaRPr lang="fr-FR" sz="1200" dirty="0"/>
           </a:p>
@@ -13806,15 +12742,7 @@
             </a:r>
             <a:r>
               <a:rPr lang="fr-FR" sz="1200" dirty="0" smtClean="0"/>
-              <a:t> – Travail </a:t>
-            </a:r>
-            <a:r>
-              <a:rPr lang="fr-FR" sz="1200" dirty="0" smtClean="0"/>
-              <a:t>effectué </a:t>
-            </a:r>
-            <a:r>
-              <a:rPr lang="fr-FR" sz="1200" dirty="0" smtClean="0"/>
-              <a:t>- Conclusion</a:t>
+              <a:t> – Travail effectué - Conclusion</a:t>
             </a:r>
             <a:endParaRPr lang="fr-FR" sz="1200" dirty="0"/>
           </a:p>
@@ -14135,15 +13063,7 @@
                   <a:schemeClr val="bg1"/>
                 </a:solidFill>
               </a:rPr>
-              <a:t>Travail </a:t>
-            </a:r>
-            <a:r>
-              <a:rPr lang="fr-FR" sz="1200" dirty="0" smtClean="0">
-                <a:solidFill>
-                  <a:schemeClr val="bg1"/>
-                </a:solidFill>
-              </a:rPr>
-              <a:t>effectué </a:t>
+              <a:t>Travail effectué </a:t>
             </a:r>
             <a:r>
               <a:rPr lang="fr-FR" sz="1200" dirty="0" smtClean="0"/>
@@ -14420,15 +13340,7 @@
                   <a:schemeClr val="bg1"/>
                 </a:solidFill>
               </a:rPr>
-              <a:t>Travail </a:t>
-            </a:r>
-            <a:r>
-              <a:rPr lang="fr-FR" sz="1200" dirty="0" smtClean="0">
-                <a:solidFill>
-                  <a:schemeClr val="bg1"/>
-                </a:solidFill>
-              </a:rPr>
-              <a:t>effectué </a:t>
+              <a:t>Travail effectué </a:t>
             </a:r>
             <a:r>
               <a:rPr lang="fr-FR" sz="1200" dirty="0" smtClean="0"/>
@@ -14593,6 +13505,13 @@
             <a:r>
               <a:rPr lang="fr-FR" sz="2400" dirty="0" smtClean="0"/>
               <a:t>Faire du pas à pas infiniment </a:t>
+            </a:r>
+            <a:endParaRPr lang="fr-FR" sz="2400" dirty="0" smtClean="0"/>
+          </a:p>
+          <a:p>
+            <a:r>
+              <a:rPr lang="fr-FR" sz="2400" dirty="0" smtClean="0"/>
+              <a:t>Export CSV </a:t>
             </a:r>
             <a:endParaRPr lang="fr-FR" sz="2400" dirty="0"/>
           </a:p>
@@ -14791,15 +13710,7 @@
           <a:p>
             <a:r>
               <a:rPr lang="fr-FR" sz="1200" dirty="0" smtClean="0"/>
-              <a:t>Introduction – Travail </a:t>
-            </a:r>
-            <a:r>
-              <a:rPr lang="fr-FR" sz="1200" dirty="0" smtClean="0"/>
-              <a:t>effectué </a:t>
-            </a:r>
-            <a:r>
-              <a:rPr lang="fr-FR" sz="1200" dirty="0" smtClean="0"/>
-              <a:t>- </a:t>
+              <a:t>Introduction – Travail effectué - </a:t>
             </a:r>
             <a:r>
               <a:rPr lang="fr-FR" sz="1200" dirty="0" smtClean="0">
@@ -14919,8 +13830,24 @@
             <a:pPr lvl="0"/>
             <a:r>
               <a:rPr lang="fr-FR" sz="2000" dirty="0"/>
-              <a:t>Nouveau Look and Feel</a:t>
+              <a:t>Nouveau Look and </a:t>
             </a:r>
+            <a:r>
+              <a:rPr lang="fr-FR" sz="2000" dirty="0" smtClean="0"/>
+              <a:t>Feel</a:t>
+            </a:r>
+          </a:p>
+          <a:p>
+            <a:pPr lvl="0"/>
+            <a:endParaRPr lang="fr-FR" sz="2000" dirty="0" smtClean="0"/>
+          </a:p>
+          <a:p>
+            <a:pPr lvl="0"/>
+            <a:r>
+              <a:rPr lang="fr-FR" sz="2000" dirty="0" smtClean="0"/>
+              <a:t>Choisir où exporter le CSV</a:t>
+            </a:r>
+            <a:endParaRPr lang="fr-FR" sz="2000" dirty="0"/>
           </a:p>
           <a:p>
             <a:endParaRPr lang="fr-FR" sz="2000" dirty="0"/>

</xml_diff>

<commit_message>
Modification de dernière minutes sur les docs
Signed-off-by: Benjamin BRAYE <benjamin.braye@viacesi.fr>
</commit_message>
<xml_diff>
--- a/Documentation/ppt_soutenance.pptx
+++ b/Documentation/ppt_soutenance.pptx
@@ -2231,8 +2231,8 @@
     <dgm:cxn modelId="{2EF138AF-2466-40D4-B5EA-1A9FCD2FD86C}" type="presOf" srcId="{B8D79EC3-D690-4B98-8432-D763CFE24F85}" destId="{038A3218-D924-4E0F-B106-63B5EE221AC4}" srcOrd="0" destOrd="0" presId="urn:microsoft.com/office/officeart/2005/8/layout/vList2"/>
     <dgm:cxn modelId="{C7C8EBF8-508B-4C5E-901B-AB18FE608ADB}" srcId="{E5F76852-CF59-4796-97E9-1DEC1672D6DA}" destId="{7F5559A7-7912-4E1A-B701-EF522B6229BC}" srcOrd="0" destOrd="0" parTransId="{14EEB626-6297-4792-BF56-AE91F621CD34}" sibTransId="{931AA3A2-4E1F-4015-B219-1BE6D3D68F19}"/>
     <dgm:cxn modelId="{1393285D-5A88-4681-84CD-9B8C94443867}" srcId="{E998230F-99D9-435B-8C6C-696A930B37E4}" destId="{A9DC048D-A0BD-4CA2-836C-8AD5D711E713}" srcOrd="0" destOrd="0" parTransId="{1B42BEAA-B6B8-46B0-A024-E71B0C0A8345}" sibTransId="{BA9B6629-AD6C-4EA7-9804-07BE2C8DA76C}"/>
+    <dgm:cxn modelId="{AAE4F25B-9998-4DC5-9389-B79C1BE7497E}" type="presOf" srcId="{4A714CE0-0FDB-4493-B328-248F29D38F60}" destId="{0530B477-2655-4DD8-8202-2C8C8C604F02}" srcOrd="0" destOrd="1" presId="urn:microsoft.com/office/officeart/2005/8/layout/vList2"/>
     <dgm:cxn modelId="{EAE6DDFC-5641-47BC-B93A-DAD47F16F14E}" type="presOf" srcId="{CE356A93-15BE-4B91-A491-4D5727DB6329}" destId="{B5DCC8EC-DC92-4DDC-A601-F883943642EA}" srcOrd="0" destOrd="0" presId="urn:microsoft.com/office/officeart/2005/8/layout/vList2"/>
-    <dgm:cxn modelId="{AAE4F25B-9998-4DC5-9389-B79C1BE7497E}" type="presOf" srcId="{4A714CE0-0FDB-4493-B328-248F29D38F60}" destId="{0530B477-2655-4DD8-8202-2C8C8C604F02}" srcOrd="0" destOrd="1" presId="urn:microsoft.com/office/officeart/2005/8/layout/vList2"/>
     <dgm:cxn modelId="{E087B482-B462-4329-81B9-04A2ED4EEF6C}" srcId="{E5F76852-CF59-4796-97E9-1DEC1672D6DA}" destId="{8D431C77-38B3-4D0F-928A-07333D2AE07F}" srcOrd="2" destOrd="0" parTransId="{96CEEE71-BA5E-4BA5-B3FD-24F8E2E41ADC}" sibTransId="{6DDE85CD-BBA4-4FC5-BA4A-4577618EC847}"/>
     <dgm:cxn modelId="{3CE9FF51-A6B8-4F19-8709-7DEF3763D57F}" type="presOf" srcId="{8A0B6BCC-5488-4238-9BC5-DDCB51F9CD8A}" destId="{0530B477-2655-4DD8-8202-2C8C8C604F02}" srcOrd="0" destOrd="3" presId="urn:microsoft.com/office/officeart/2005/8/layout/vList2"/>
     <dgm:cxn modelId="{50B7762B-CBBD-4F2B-AEF2-1838ADD1D978}" srcId="{CE356A93-15BE-4B91-A491-4D5727DB6329}" destId="{E998230F-99D9-435B-8C6C-696A930B37E4}" srcOrd="0" destOrd="0" parTransId="{FA4314EE-B75E-4B1A-97F0-255BCBDE2F70}" sibTransId="{858C5A1F-D120-46B4-9225-AA79639A6F91}"/>
@@ -2699,6 +2699,617 @@
       <dsp:cNvGrpSpPr/>
     </dsp:nvGrpSpPr>
     <dsp:grpSpPr/>
+    <dsp:sp modelId="{6C613A2A-6C83-4D32-A0C4-0FAB71AD5AAA}">
+      <dsp:nvSpPr>
+        <dsp:cNvPr id="0" name=""/>
+        <dsp:cNvSpPr/>
+      </dsp:nvSpPr>
+      <dsp:spPr>
+        <a:xfrm>
+          <a:off x="0" y="50433"/>
+          <a:ext cx="7344816" cy="491399"/>
+        </a:xfrm>
+        <a:prstGeom prst="roundRect">
+          <a:avLst/>
+        </a:prstGeom>
+        <a:gradFill rotWithShape="0">
+          <a:gsLst>
+            <a:gs pos="0">
+              <a:schemeClr val="accent1">
+                <a:hueOff val="0"/>
+                <a:satOff val="0"/>
+                <a:lumOff val="0"/>
+                <a:alphaOff val="0"/>
+                <a:tint val="96000"/>
+                <a:lumMod val="100000"/>
+              </a:schemeClr>
+            </a:gs>
+            <a:gs pos="78000">
+              <a:schemeClr val="accent1">
+                <a:hueOff val="0"/>
+                <a:satOff val="0"/>
+                <a:lumOff val="0"/>
+                <a:alphaOff val="0"/>
+                <a:shade val="94000"/>
+                <a:lumMod val="94000"/>
+              </a:schemeClr>
+            </a:gs>
+          </a:gsLst>
+          <a:lin ang="5400000" scaled="0"/>
+        </a:gradFill>
+        <a:ln>
+          <a:noFill/>
+        </a:ln>
+        <a:effectLst>
+          <a:outerShdw blurRad="50800" dist="38100" dir="5400000" rotWithShape="0">
+            <a:srgbClr val="000000">
+              <a:alpha val="35000"/>
+            </a:srgbClr>
+          </a:outerShdw>
+        </a:effectLst>
+        <a:scene3d>
+          <a:camera prst="orthographicFront">
+            <a:rot lat="0" lon="0" rev="0"/>
+          </a:camera>
+          <a:lightRig rig="threePt" dir="tl"/>
+        </a:scene3d>
+        <a:sp3d prstMaterial="plastic">
+          <a:bevelT w="0" h="0"/>
+        </a:sp3d>
+      </dsp:spPr>
+      <dsp:style>
+        <a:lnRef idx="0">
+          <a:scrgbClr r="0" g="0" b="0"/>
+        </a:lnRef>
+        <a:fillRef idx="3">
+          <a:scrgbClr r="0" g="0" b="0"/>
+        </a:fillRef>
+        <a:effectRef idx="3">
+          <a:scrgbClr r="0" g="0" b="0"/>
+        </a:effectRef>
+        <a:fontRef idx="minor">
+          <a:schemeClr val="lt1"/>
+        </a:fontRef>
+      </dsp:style>
+      <dsp:txBody>
+        <a:bodyPr spcFirstLastPara="0" vert="horz" wrap="square" lIns="80010" tIns="80010" rIns="80010" bIns="80010" numCol="1" spcCol="1270" anchor="ctr" anchorCtr="0">
+          <a:noAutofit/>
+        </a:bodyPr>
+        <a:lstStyle/>
+        <a:p>
+          <a:pPr lvl="0" algn="l" defTabSz="933450">
+            <a:lnSpc>
+              <a:spcPct val="90000"/>
+            </a:lnSpc>
+            <a:spcBef>
+              <a:spcPct val="0"/>
+            </a:spcBef>
+            <a:spcAft>
+              <a:spcPct val="35000"/>
+            </a:spcAft>
+          </a:pPr>
+          <a:r>
+            <a:rPr lang="fr-FR" sz="2100" kern="1200" dirty="0" smtClean="0"/>
+            <a:t>Introduction</a:t>
+          </a:r>
+          <a:endParaRPr lang="fr-FR" sz="2100" kern="1200" dirty="0"/>
+        </a:p>
+      </dsp:txBody>
+      <dsp:txXfrm>
+        <a:off x="23988" y="74421"/>
+        <a:ext cx="7296840" cy="443423"/>
+      </dsp:txXfrm>
+    </dsp:sp>
+    <dsp:sp modelId="{8360DFC4-69CA-4835-9D1A-F47FDB6123C0}">
+      <dsp:nvSpPr>
+        <dsp:cNvPr id="0" name=""/>
+        <dsp:cNvSpPr/>
+      </dsp:nvSpPr>
+      <dsp:spPr>
+        <a:xfrm>
+          <a:off x="0" y="541833"/>
+          <a:ext cx="7344816" cy="804194"/>
+        </a:xfrm>
+        <a:prstGeom prst="rect">
+          <a:avLst/>
+        </a:prstGeom>
+        <a:noFill/>
+        <a:ln>
+          <a:noFill/>
+        </a:ln>
+        <a:effectLst/>
+      </dsp:spPr>
+      <dsp:style>
+        <a:lnRef idx="0">
+          <a:scrgbClr r="0" g="0" b="0"/>
+        </a:lnRef>
+        <a:fillRef idx="0">
+          <a:scrgbClr r="0" g="0" b="0"/>
+        </a:fillRef>
+        <a:effectRef idx="0">
+          <a:scrgbClr r="0" g="0" b="0"/>
+        </a:effectRef>
+        <a:fontRef idx="minor"/>
+      </dsp:style>
+      <dsp:txBody>
+        <a:bodyPr spcFirstLastPara="0" vert="horz" wrap="square" lIns="233198" tIns="26670" rIns="149352" bIns="26670" numCol="1" spcCol="1270" anchor="t" anchorCtr="0">
+          <a:noAutofit/>
+        </a:bodyPr>
+        <a:lstStyle/>
+        <a:p>
+          <a:pPr marL="171450" lvl="1" indent="-171450" algn="l" defTabSz="711200">
+            <a:lnSpc>
+              <a:spcPct val="90000"/>
+            </a:lnSpc>
+            <a:spcBef>
+              <a:spcPct val="0"/>
+            </a:spcBef>
+            <a:spcAft>
+              <a:spcPct val="20000"/>
+            </a:spcAft>
+            <a:buChar char="••"/>
+          </a:pPr>
+          <a:r>
+            <a:rPr lang="fr-FR" sz="1600" kern="1200" dirty="0" smtClean="0"/>
+            <a:t>Présentation de l’équipe</a:t>
+          </a:r>
+          <a:endParaRPr lang="fr-FR" sz="1600" kern="1200" dirty="0"/>
+        </a:p>
+        <a:p>
+          <a:pPr marL="171450" lvl="1" indent="-171450" algn="l" defTabSz="711200">
+            <a:lnSpc>
+              <a:spcPct val="90000"/>
+            </a:lnSpc>
+            <a:spcBef>
+              <a:spcPct val="0"/>
+            </a:spcBef>
+            <a:spcAft>
+              <a:spcPct val="20000"/>
+            </a:spcAft>
+            <a:buChar char="••"/>
+          </a:pPr>
+          <a:r>
+            <a:rPr lang="fr-FR" sz="1600" kern="1200" dirty="0" smtClean="0"/>
+            <a:t>Présentation du projet</a:t>
+          </a:r>
+          <a:endParaRPr lang="fr-FR" sz="1600" kern="1200" dirty="0"/>
+        </a:p>
+        <a:p>
+          <a:pPr marL="171450" lvl="1" indent="-171450" algn="l" defTabSz="711200">
+            <a:lnSpc>
+              <a:spcPct val="90000"/>
+            </a:lnSpc>
+            <a:spcBef>
+              <a:spcPct val="0"/>
+            </a:spcBef>
+            <a:spcAft>
+              <a:spcPct val="20000"/>
+            </a:spcAft>
+            <a:buChar char="••"/>
+          </a:pPr>
+          <a:endParaRPr lang="fr-FR" sz="1600" kern="1200" dirty="0"/>
+        </a:p>
+      </dsp:txBody>
+      <dsp:txXfrm>
+        <a:off x="0" y="541833"/>
+        <a:ext cx="7344816" cy="804194"/>
+      </dsp:txXfrm>
+    </dsp:sp>
+    <dsp:sp modelId="{069AAD42-5E49-4B02-AA3B-94FAB2E79C39}">
+      <dsp:nvSpPr>
+        <dsp:cNvPr id="0" name=""/>
+        <dsp:cNvSpPr/>
+      </dsp:nvSpPr>
+      <dsp:spPr>
+        <a:xfrm>
+          <a:off x="0" y="1219617"/>
+          <a:ext cx="7344816" cy="491399"/>
+        </a:xfrm>
+        <a:prstGeom prst="roundRect">
+          <a:avLst/>
+        </a:prstGeom>
+        <a:gradFill rotWithShape="0">
+          <a:gsLst>
+            <a:gs pos="0">
+              <a:schemeClr val="accent1">
+                <a:hueOff val="0"/>
+                <a:satOff val="0"/>
+                <a:lumOff val="0"/>
+                <a:alphaOff val="0"/>
+                <a:tint val="96000"/>
+                <a:lumMod val="100000"/>
+              </a:schemeClr>
+            </a:gs>
+            <a:gs pos="78000">
+              <a:schemeClr val="accent1">
+                <a:hueOff val="0"/>
+                <a:satOff val="0"/>
+                <a:lumOff val="0"/>
+                <a:alphaOff val="0"/>
+                <a:shade val="94000"/>
+                <a:lumMod val="94000"/>
+              </a:schemeClr>
+            </a:gs>
+          </a:gsLst>
+          <a:lin ang="5400000" scaled="0"/>
+        </a:gradFill>
+        <a:ln>
+          <a:noFill/>
+        </a:ln>
+        <a:effectLst>
+          <a:outerShdw blurRad="50800" dist="38100" dir="5400000" rotWithShape="0">
+            <a:srgbClr val="000000">
+              <a:alpha val="35000"/>
+            </a:srgbClr>
+          </a:outerShdw>
+        </a:effectLst>
+        <a:scene3d>
+          <a:camera prst="orthographicFront">
+            <a:rot lat="0" lon="0" rev="0"/>
+          </a:camera>
+          <a:lightRig rig="threePt" dir="tl"/>
+        </a:scene3d>
+        <a:sp3d prstMaterial="plastic">
+          <a:bevelT w="0" h="0"/>
+        </a:sp3d>
+      </dsp:spPr>
+      <dsp:style>
+        <a:lnRef idx="0">
+          <a:scrgbClr r="0" g="0" b="0"/>
+        </a:lnRef>
+        <a:fillRef idx="3">
+          <a:scrgbClr r="0" g="0" b="0"/>
+        </a:fillRef>
+        <a:effectRef idx="3">
+          <a:scrgbClr r="0" g="0" b="0"/>
+        </a:effectRef>
+        <a:fontRef idx="minor">
+          <a:schemeClr val="lt1"/>
+        </a:fontRef>
+      </dsp:style>
+      <dsp:txBody>
+        <a:bodyPr spcFirstLastPara="0" vert="horz" wrap="square" lIns="80010" tIns="80010" rIns="80010" bIns="80010" numCol="1" spcCol="1270" anchor="ctr" anchorCtr="0">
+          <a:noAutofit/>
+        </a:bodyPr>
+        <a:lstStyle/>
+        <a:p>
+          <a:pPr lvl="0" algn="l" defTabSz="933450">
+            <a:lnSpc>
+              <a:spcPct val="90000"/>
+            </a:lnSpc>
+            <a:spcBef>
+              <a:spcPct val="0"/>
+            </a:spcBef>
+            <a:spcAft>
+              <a:spcPct val="35000"/>
+            </a:spcAft>
+          </a:pPr>
+          <a:r>
+            <a:rPr lang="fr-FR" sz="2100" kern="1200" dirty="0" smtClean="0"/>
+            <a:t>Travail réalisé</a:t>
+          </a:r>
+          <a:endParaRPr lang="fr-FR" sz="2100" kern="1200" dirty="0"/>
+        </a:p>
+      </dsp:txBody>
+      <dsp:txXfrm>
+        <a:off x="23988" y="1243605"/>
+        <a:ext cx="7296840" cy="443423"/>
+      </dsp:txXfrm>
+    </dsp:sp>
+    <dsp:sp modelId="{038A3218-D924-4E0F-B106-63B5EE221AC4}">
+      <dsp:nvSpPr>
+        <dsp:cNvPr id="0" name=""/>
+        <dsp:cNvSpPr/>
+      </dsp:nvSpPr>
+      <dsp:spPr>
+        <a:xfrm>
+          <a:off x="0" y="1837428"/>
+          <a:ext cx="7344816" cy="804194"/>
+        </a:xfrm>
+        <a:prstGeom prst="rect">
+          <a:avLst/>
+        </a:prstGeom>
+        <a:noFill/>
+        <a:ln>
+          <a:noFill/>
+        </a:ln>
+        <a:effectLst/>
+      </dsp:spPr>
+      <dsp:style>
+        <a:lnRef idx="0">
+          <a:scrgbClr r="0" g="0" b="0"/>
+        </a:lnRef>
+        <a:fillRef idx="0">
+          <a:scrgbClr r="0" g="0" b="0"/>
+        </a:fillRef>
+        <a:effectRef idx="0">
+          <a:scrgbClr r="0" g="0" b="0"/>
+        </a:effectRef>
+        <a:fontRef idx="minor"/>
+      </dsp:style>
+      <dsp:txBody>
+        <a:bodyPr spcFirstLastPara="0" vert="horz" wrap="square" lIns="233198" tIns="26670" rIns="149352" bIns="26670" numCol="1" spcCol="1270" anchor="t" anchorCtr="0">
+          <a:noAutofit/>
+        </a:bodyPr>
+        <a:lstStyle/>
+        <a:p>
+          <a:pPr marL="171450" lvl="1" indent="-171450" algn="l" defTabSz="711200">
+            <a:lnSpc>
+              <a:spcPct val="90000"/>
+            </a:lnSpc>
+            <a:spcBef>
+              <a:spcPct val="0"/>
+            </a:spcBef>
+            <a:spcAft>
+              <a:spcPct val="20000"/>
+            </a:spcAft>
+            <a:buChar char="••"/>
+          </a:pPr>
+          <a:r>
+            <a:rPr lang="fr-FR" sz="1600" kern="1200" dirty="0" smtClean="0"/>
+            <a:t>Planning</a:t>
+          </a:r>
+          <a:endParaRPr lang="fr-FR" sz="1600" kern="1200" dirty="0"/>
+        </a:p>
+        <a:p>
+          <a:pPr marL="171450" lvl="1" indent="-171450" algn="l" defTabSz="711200">
+            <a:lnSpc>
+              <a:spcPct val="90000"/>
+            </a:lnSpc>
+            <a:spcBef>
+              <a:spcPct val="0"/>
+            </a:spcBef>
+            <a:spcAft>
+              <a:spcPct val="20000"/>
+            </a:spcAft>
+            <a:buChar char="••"/>
+          </a:pPr>
+          <a:r>
+            <a:rPr lang="fr-FR" sz="1600" kern="1200" dirty="0" smtClean="0"/>
+            <a:t>Démonstration</a:t>
+          </a:r>
+          <a:endParaRPr lang="fr-FR" sz="1600" kern="1200" dirty="0"/>
+        </a:p>
+        <a:p>
+          <a:pPr marL="171450" lvl="1" indent="-171450" algn="l" defTabSz="711200">
+            <a:lnSpc>
+              <a:spcPct val="90000"/>
+            </a:lnSpc>
+            <a:spcBef>
+              <a:spcPct val="0"/>
+            </a:spcBef>
+            <a:spcAft>
+              <a:spcPct val="20000"/>
+            </a:spcAft>
+            <a:buChar char="••"/>
+          </a:pPr>
+          <a:endParaRPr lang="fr-FR" sz="1600" kern="1200" dirty="0"/>
+        </a:p>
+      </dsp:txBody>
+      <dsp:txXfrm>
+        <a:off x="0" y="1837428"/>
+        <a:ext cx="7344816" cy="804194"/>
+      </dsp:txXfrm>
+    </dsp:sp>
+    <dsp:sp modelId="{DB829C1A-1324-4D6E-8480-917BED10E497}">
+      <dsp:nvSpPr>
+        <dsp:cNvPr id="0" name=""/>
+        <dsp:cNvSpPr/>
+      </dsp:nvSpPr>
+      <dsp:spPr>
+        <a:xfrm>
+          <a:off x="0" y="2641623"/>
+          <a:ext cx="7344816" cy="491399"/>
+        </a:xfrm>
+        <a:prstGeom prst="roundRect">
+          <a:avLst/>
+        </a:prstGeom>
+        <a:gradFill rotWithShape="0">
+          <a:gsLst>
+            <a:gs pos="0">
+              <a:schemeClr val="accent1">
+                <a:hueOff val="0"/>
+                <a:satOff val="0"/>
+                <a:lumOff val="0"/>
+                <a:alphaOff val="0"/>
+                <a:tint val="96000"/>
+                <a:lumMod val="100000"/>
+              </a:schemeClr>
+            </a:gs>
+            <a:gs pos="78000">
+              <a:schemeClr val="accent1">
+                <a:hueOff val="0"/>
+                <a:satOff val="0"/>
+                <a:lumOff val="0"/>
+                <a:alphaOff val="0"/>
+                <a:shade val="94000"/>
+                <a:lumMod val="94000"/>
+              </a:schemeClr>
+            </a:gs>
+          </a:gsLst>
+          <a:lin ang="5400000" scaled="0"/>
+        </a:gradFill>
+        <a:ln>
+          <a:noFill/>
+        </a:ln>
+        <a:effectLst>
+          <a:outerShdw blurRad="50800" dist="38100" dir="5400000" rotWithShape="0">
+            <a:srgbClr val="000000">
+              <a:alpha val="35000"/>
+            </a:srgbClr>
+          </a:outerShdw>
+        </a:effectLst>
+        <a:scene3d>
+          <a:camera prst="orthographicFront">
+            <a:rot lat="0" lon="0" rev="0"/>
+          </a:camera>
+          <a:lightRig rig="threePt" dir="tl"/>
+        </a:scene3d>
+        <a:sp3d prstMaterial="plastic">
+          <a:bevelT w="0" h="0"/>
+        </a:sp3d>
+      </dsp:spPr>
+      <dsp:style>
+        <a:lnRef idx="0">
+          <a:scrgbClr r="0" g="0" b="0"/>
+        </a:lnRef>
+        <a:fillRef idx="3">
+          <a:scrgbClr r="0" g="0" b="0"/>
+        </a:fillRef>
+        <a:effectRef idx="3">
+          <a:scrgbClr r="0" g="0" b="0"/>
+        </a:effectRef>
+        <a:fontRef idx="minor">
+          <a:schemeClr val="lt1"/>
+        </a:fontRef>
+      </dsp:style>
+      <dsp:txBody>
+        <a:bodyPr spcFirstLastPara="0" vert="horz" wrap="square" lIns="80010" tIns="80010" rIns="80010" bIns="80010" numCol="1" spcCol="1270" anchor="ctr" anchorCtr="0">
+          <a:noAutofit/>
+        </a:bodyPr>
+        <a:lstStyle/>
+        <a:p>
+          <a:pPr lvl="0" algn="l" defTabSz="933450">
+            <a:lnSpc>
+              <a:spcPct val="90000"/>
+            </a:lnSpc>
+            <a:spcBef>
+              <a:spcPct val="0"/>
+            </a:spcBef>
+            <a:spcAft>
+              <a:spcPct val="35000"/>
+            </a:spcAft>
+          </a:pPr>
+          <a:r>
+            <a:rPr lang="fr-FR" sz="2100" kern="1200" dirty="0" smtClean="0"/>
+            <a:t>Conclusion</a:t>
+          </a:r>
+          <a:endParaRPr lang="fr-FR" sz="2100" kern="1200" dirty="0"/>
+        </a:p>
+      </dsp:txBody>
+      <dsp:txXfrm>
+        <a:off x="23988" y="2665611"/>
+        <a:ext cx="7296840" cy="443423"/>
+      </dsp:txXfrm>
+    </dsp:sp>
+    <dsp:sp modelId="{0530B477-2655-4DD8-8202-2C8C8C604F02}">
+      <dsp:nvSpPr>
+        <dsp:cNvPr id="0" name=""/>
+        <dsp:cNvSpPr/>
+      </dsp:nvSpPr>
+      <dsp:spPr>
+        <a:xfrm>
+          <a:off x="0" y="3133023"/>
+          <a:ext cx="7344816" cy="1065015"/>
+        </a:xfrm>
+        <a:prstGeom prst="rect">
+          <a:avLst/>
+        </a:prstGeom>
+        <a:noFill/>
+        <a:ln>
+          <a:noFill/>
+        </a:ln>
+        <a:effectLst/>
+      </dsp:spPr>
+      <dsp:style>
+        <a:lnRef idx="0">
+          <a:scrgbClr r="0" g="0" b="0"/>
+        </a:lnRef>
+        <a:fillRef idx="0">
+          <a:scrgbClr r="0" g="0" b="0"/>
+        </a:fillRef>
+        <a:effectRef idx="0">
+          <a:scrgbClr r="0" g="0" b="0"/>
+        </a:effectRef>
+        <a:fontRef idx="minor"/>
+      </dsp:style>
+      <dsp:txBody>
+        <a:bodyPr spcFirstLastPara="0" vert="horz" wrap="square" lIns="233198" tIns="26670" rIns="149352" bIns="26670" numCol="1" spcCol="1270" anchor="t" anchorCtr="0">
+          <a:noAutofit/>
+        </a:bodyPr>
+        <a:lstStyle/>
+        <a:p>
+          <a:pPr marL="171450" lvl="1" indent="-171450" algn="l" defTabSz="711200">
+            <a:lnSpc>
+              <a:spcPct val="90000"/>
+            </a:lnSpc>
+            <a:spcBef>
+              <a:spcPct val="0"/>
+            </a:spcBef>
+            <a:spcAft>
+              <a:spcPct val="20000"/>
+            </a:spcAft>
+            <a:buChar char="••"/>
+          </a:pPr>
+          <a:r>
+            <a:rPr lang="fr-FR" sz="1600" kern="1200" dirty="0" smtClean="0"/>
+            <a:t>Points forts</a:t>
+          </a:r>
+          <a:endParaRPr lang="fr-FR" sz="1600" kern="1200" dirty="0"/>
+        </a:p>
+        <a:p>
+          <a:pPr marL="171450" lvl="1" indent="-171450" algn="l" defTabSz="711200">
+            <a:lnSpc>
+              <a:spcPct val="90000"/>
+            </a:lnSpc>
+            <a:spcBef>
+              <a:spcPct val="0"/>
+            </a:spcBef>
+            <a:spcAft>
+              <a:spcPct val="20000"/>
+            </a:spcAft>
+            <a:buChar char="••"/>
+          </a:pPr>
+          <a:r>
+            <a:rPr lang="fr-FR" sz="1600" kern="1200" dirty="0" smtClean="0"/>
+            <a:t>Perspectives d’évolution</a:t>
+          </a:r>
+          <a:endParaRPr lang="fr-FR" sz="1600" kern="1200" dirty="0"/>
+        </a:p>
+        <a:p>
+          <a:pPr marL="171450" lvl="1" indent="-171450" algn="l" defTabSz="711200">
+            <a:lnSpc>
+              <a:spcPct val="90000"/>
+            </a:lnSpc>
+            <a:spcBef>
+              <a:spcPct val="0"/>
+            </a:spcBef>
+            <a:spcAft>
+              <a:spcPct val="20000"/>
+            </a:spcAft>
+            <a:buChar char="••"/>
+          </a:pPr>
+          <a:r>
+            <a:rPr lang="fr-FR" sz="1600" kern="1200" dirty="0" smtClean="0"/>
+            <a:t>Bilan</a:t>
+          </a:r>
+          <a:endParaRPr lang="fr-FR" sz="1600" kern="1200" dirty="0"/>
+        </a:p>
+        <a:p>
+          <a:pPr marL="171450" lvl="1" indent="-171450" algn="l" defTabSz="711200">
+            <a:lnSpc>
+              <a:spcPct val="90000"/>
+            </a:lnSpc>
+            <a:spcBef>
+              <a:spcPct val="0"/>
+            </a:spcBef>
+            <a:spcAft>
+              <a:spcPct val="20000"/>
+            </a:spcAft>
+            <a:buChar char="••"/>
+          </a:pPr>
+          <a:r>
+            <a:rPr lang="fr-FR" sz="1600" kern="1200" dirty="0" smtClean="0"/>
+            <a:t>Conclusion</a:t>
+          </a:r>
+          <a:endParaRPr lang="fr-FR" sz="1600" kern="1200" dirty="0"/>
+        </a:p>
+      </dsp:txBody>
+      <dsp:txXfrm>
+        <a:off x="0" y="3133023"/>
+        <a:ext cx="7344816" cy="1065015"/>
+      </dsp:txXfrm>
+    </dsp:sp>
   </dsp:spTree>
 </dsp:drawing>
 </file>
@@ -2711,6 +3322,427 @@
       <dsp:cNvGrpSpPr/>
     </dsp:nvGrpSpPr>
     <dsp:grpSpPr/>
+    <dsp:sp modelId="{EDC967A1-A952-4850-8EF8-40949E34F7C6}">
+      <dsp:nvSpPr>
+        <dsp:cNvPr id="0" name=""/>
+        <dsp:cNvSpPr/>
+      </dsp:nvSpPr>
+      <dsp:spPr>
+        <a:xfrm>
+          <a:off x="0" y="333143"/>
+          <a:ext cx="6777037" cy="876487"/>
+        </a:xfrm>
+        <a:prstGeom prst="rect">
+          <a:avLst/>
+        </a:prstGeom>
+        <a:solidFill>
+          <a:schemeClr val="lt1">
+            <a:alpha val="90000"/>
+            <a:hueOff val="0"/>
+            <a:satOff val="0"/>
+            <a:lumOff val="0"/>
+            <a:alphaOff val="0"/>
+          </a:schemeClr>
+        </a:solidFill>
+        <a:ln w="12700" cap="rnd" cmpd="sng" algn="ctr">
+          <a:solidFill>
+            <a:schemeClr val="accent1">
+              <a:hueOff val="0"/>
+              <a:satOff val="0"/>
+              <a:lumOff val="0"/>
+              <a:alphaOff val="0"/>
+            </a:schemeClr>
+          </a:solidFill>
+          <a:prstDash val="solid"/>
+        </a:ln>
+        <a:effectLst>
+          <a:outerShdw blurRad="38100" dist="25400" dir="5400000" rotWithShape="0">
+            <a:srgbClr val="000000">
+              <a:alpha val="35000"/>
+            </a:srgbClr>
+          </a:outerShdw>
+        </a:effectLst>
+      </dsp:spPr>
+      <dsp:style>
+        <a:lnRef idx="1">
+          <a:scrgbClr r="0" g="0" b="0"/>
+        </a:lnRef>
+        <a:fillRef idx="1">
+          <a:scrgbClr r="0" g="0" b="0"/>
+        </a:fillRef>
+        <a:effectRef idx="2">
+          <a:scrgbClr r="0" g="0" b="0"/>
+        </a:effectRef>
+        <a:fontRef idx="minor"/>
+      </dsp:style>
+      <dsp:txBody>
+        <a:bodyPr spcFirstLastPara="0" vert="horz" wrap="square" lIns="525973" tIns="437388" rIns="525973" bIns="149352" numCol="1" spcCol="1270" anchor="t" anchorCtr="0">
+          <a:noAutofit/>
+        </a:bodyPr>
+        <a:lstStyle/>
+        <a:p>
+          <a:pPr marL="228600" lvl="1" indent="-228600" algn="l" defTabSz="933450">
+            <a:lnSpc>
+              <a:spcPct val="90000"/>
+            </a:lnSpc>
+            <a:spcBef>
+              <a:spcPct val="0"/>
+            </a:spcBef>
+            <a:spcAft>
+              <a:spcPct val="15000"/>
+            </a:spcAft>
+            <a:buChar char="••"/>
+          </a:pPr>
+          <a:r>
+            <a:rPr lang="fr-FR" sz="2100" kern="1200" dirty="0" smtClean="0"/>
+            <a:t>Benjamin BRAYE</a:t>
+          </a:r>
+          <a:endParaRPr lang="fr-FR" sz="2100" kern="1200" dirty="0"/>
+        </a:p>
+      </dsp:txBody>
+      <dsp:txXfrm>
+        <a:off x="0" y="333143"/>
+        <a:ext cx="6777037" cy="876487"/>
+      </dsp:txXfrm>
+    </dsp:sp>
+    <dsp:sp modelId="{46A8A9F3-1460-4DD5-A042-AA58CF8CC3C0}">
+      <dsp:nvSpPr>
+        <dsp:cNvPr id="0" name=""/>
+        <dsp:cNvSpPr/>
+      </dsp:nvSpPr>
+      <dsp:spPr>
+        <a:xfrm>
+          <a:off x="338851" y="23183"/>
+          <a:ext cx="4743925" cy="619920"/>
+        </a:xfrm>
+        <a:prstGeom prst="roundRect">
+          <a:avLst/>
+        </a:prstGeom>
+        <a:gradFill rotWithShape="0">
+          <a:gsLst>
+            <a:gs pos="0">
+              <a:schemeClr val="accent1">
+                <a:hueOff val="0"/>
+                <a:satOff val="0"/>
+                <a:lumOff val="0"/>
+                <a:alphaOff val="0"/>
+                <a:tint val="96000"/>
+                <a:lumMod val="100000"/>
+              </a:schemeClr>
+            </a:gs>
+            <a:gs pos="78000">
+              <a:schemeClr val="accent1">
+                <a:hueOff val="0"/>
+                <a:satOff val="0"/>
+                <a:lumOff val="0"/>
+                <a:alphaOff val="0"/>
+                <a:shade val="94000"/>
+                <a:lumMod val="94000"/>
+              </a:schemeClr>
+            </a:gs>
+          </a:gsLst>
+          <a:lin ang="5400000" scaled="0"/>
+        </a:gradFill>
+        <a:ln>
+          <a:noFill/>
+        </a:ln>
+        <a:effectLst>
+          <a:outerShdw blurRad="50800" dist="38100" dir="5400000" rotWithShape="0">
+            <a:srgbClr val="000000">
+              <a:alpha val="35000"/>
+            </a:srgbClr>
+          </a:outerShdw>
+        </a:effectLst>
+        <a:scene3d>
+          <a:camera prst="orthographicFront">
+            <a:rot lat="0" lon="0" rev="0"/>
+          </a:camera>
+          <a:lightRig rig="threePt" dir="tl"/>
+        </a:scene3d>
+        <a:sp3d prstMaterial="plastic">
+          <a:bevelT w="0" h="0"/>
+        </a:sp3d>
+      </dsp:spPr>
+      <dsp:style>
+        <a:lnRef idx="0">
+          <a:scrgbClr r="0" g="0" b="0"/>
+        </a:lnRef>
+        <a:fillRef idx="3">
+          <a:scrgbClr r="0" g="0" b="0"/>
+        </a:fillRef>
+        <a:effectRef idx="3">
+          <a:scrgbClr r="0" g="0" b="0"/>
+        </a:effectRef>
+        <a:fontRef idx="minor">
+          <a:schemeClr val="lt1"/>
+        </a:fontRef>
+      </dsp:style>
+      <dsp:txBody>
+        <a:bodyPr spcFirstLastPara="0" vert="horz" wrap="square" lIns="179309" tIns="0" rIns="179309" bIns="0" numCol="1" spcCol="1270" anchor="ctr" anchorCtr="0">
+          <a:noAutofit/>
+        </a:bodyPr>
+        <a:lstStyle/>
+        <a:p>
+          <a:pPr lvl="0" algn="l" defTabSz="933450">
+            <a:lnSpc>
+              <a:spcPct val="90000"/>
+            </a:lnSpc>
+            <a:spcBef>
+              <a:spcPct val="0"/>
+            </a:spcBef>
+            <a:spcAft>
+              <a:spcPct val="35000"/>
+            </a:spcAft>
+          </a:pPr>
+          <a:r>
+            <a:rPr lang="fr-FR" sz="2100" kern="1200" dirty="0" smtClean="0"/>
+            <a:t>Chef de projet</a:t>
+          </a:r>
+          <a:endParaRPr lang="fr-FR" sz="2100" kern="1200" dirty="0"/>
+        </a:p>
+      </dsp:txBody>
+      <dsp:txXfrm>
+        <a:off x="369113" y="53445"/>
+        <a:ext cx="4683401" cy="559396"/>
+      </dsp:txXfrm>
+    </dsp:sp>
+    <dsp:sp modelId="{3AF7F569-1D0D-4E1D-AFED-38E8A06A1015}">
+      <dsp:nvSpPr>
+        <dsp:cNvPr id="0" name=""/>
+        <dsp:cNvSpPr/>
+      </dsp:nvSpPr>
+      <dsp:spPr>
+        <a:xfrm>
+          <a:off x="0" y="1632991"/>
+          <a:ext cx="6777037" cy="1852200"/>
+        </a:xfrm>
+        <a:prstGeom prst="rect">
+          <a:avLst/>
+        </a:prstGeom>
+        <a:solidFill>
+          <a:schemeClr val="lt1">
+            <a:alpha val="90000"/>
+            <a:hueOff val="0"/>
+            <a:satOff val="0"/>
+            <a:lumOff val="0"/>
+            <a:alphaOff val="0"/>
+          </a:schemeClr>
+        </a:solidFill>
+        <a:ln w="12700" cap="rnd" cmpd="sng" algn="ctr">
+          <a:solidFill>
+            <a:schemeClr val="accent1">
+              <a:hueOff val="0"/>
+              <a:satOff val="0"/>
+              <a:lumOff val="0"/>
+              <a:alphaOff val="0"/>
+            </a:schemeClr>
+          </a:solidFill>
+          <a:prstDash val="solid"/>
+        </a:ln>
+        <a:effectLst>
+          <a:outerShdw blurRad="38100" dist="25400" dir="5400000" rotWithShape="0">
+            <a:srgbClr val="000000">
+              <a:alpha val="35000"/>
+            </a:srgbClr>
+          </a:outerShdw>
+        </a:effectLst>
+      </dsp:spPr>
+      <dsp:style>
+        <a:lnRef idx="1">
+          <a:scrgbClr r="0" g="0" b="0"/>
+        </a:lnRef>
+        <a:fillRef idx="1">
+          <a:scrgbClr r="0" g="0" b="0"/>
+        </a:fillRef>
+        <a:effectRef idx="2">
+          <a:scrgbClr r="0" g="0" b="0"/>
+        </a:effectRef>
+        <a:fontRef idx="minor"/>
+      </dsp:style>
+      <dsp:txBody>
+        <a:bodyPr spcFirstLastPara="0" vert="horz" wrap="square" lIns="525973" tIns="437388" rIns="525973" bIns="149352" numCol="1" spcCol="1270" anchor="t" anchorCtr="0">
+          <a:noAutofit/>
+        </a:bodyPr>
+        <a:lstStyle/>
+        <a:p>
+          <a:pPr marL="228600" lvl="1" indent="-228600" algn="l" defTabSz="933450">
+            <a:lnSpc>
+              <a:spcPct val="90000"/>
+            </a:lnSpc>
+            <a:spcBef>
+              <a:spcPct val="0"/>
+            </a:spcBef>
+            <a:spcAft>
+              <a:spcPct val="15000"/>
+            </a:spcAft>
+            <a:buChar char="••"/>
+          </a:pPr>
+          <a:r>
+            <a:rPr lang="fr-FR" sz="2100" kern="1200" dirty="0" smtClean="0"/>
+            <a:t>Antoine-Ali ZARROUK</a:t>
+          </a:r>
+          <a:endParaRPr lang="fr-FR" sz="2100" kern="1200" dirty="0"/>
+        </a:p>
+        <a:p>
+          <a:pPr marL="228600" lvl="1" indent="-228600" algn="l" defTabSz="933450">
+            <a:lnSpc>
+              <a:spcPct val="90000"/>
+            </a:lnSpc>
+            <a:spcBef>
+              <a:spcPct val="0"/>
+            </a:spcBef>
+            <a:spcAft>
+              <a:spcPct val="15000"/>
+            </a:spcAft>
+            <a:buChar char="••"/>
+          </a:pPr>
+          <a:r>
+            <a:rPr lang="fr-FR" sz="2100" kern="1200" dirty="0" smtClean="0"/>
+            <a:t>Gwilherm BERNARD</a:t>
+          </a:r>
+          <a:endParaRPr lang="fr-FR" sz="2100" kern="1200" dirty="0"/>
+        </a:p>
+        <a:p>
+          <a:pPr marL="228600" lvl="1" indent="-228600" algn="l" defTabSz="933450">
+            <a:lnSpc>
+              <a:spcPct val="90000"/>
+            </a:lnSpc>
+            <a:spcBef>
+              <a:spcPct val="0"/>
+            </a:spcBef>
+            <a:spcAft>
+              <a:spcPct val="15000"/>
+            </a:spcAft>
+            <a:buChar char="••"/>
+          </a:pPr>
+          <a:r>
+            <a:rPr lang="fr-FR" sz="2100" kern="1200" dirty="0" smtClean="0"/>
+            <a:t>Arnaud GRASTIEN</a:t>
+          </a:r>
+          <a:endParaRPr lang="fr-FR" sz="2100" kern="1200" dirty="0"/>
+        </a:p>
+        <a:p>
+          <a:pPr marL="228600" lvl="1" indent="-228600" algn="l" defTabSz="933450">
+            <a:lnSpc>
+              <a:spcPct val="90000"/>
+            </a:lnSpc>
+            <a:spcBef>
+              <a:spcPct val="0"/>
+            </a:spcBef>
+            <a:spcAft>
+              <a:spcPct val="15000"/>
+            </a:spcAft>
+            <a:buChar char="••"/>
+          </a:pPr>
+          <a:endParaRPr lang="fr-FR" sz="2100" kern="1200" dirty="0"/>
+        </a:p>
+      </dsp:txBody>
+      <dsp:txXfrm>
+        <a:off x="0" y="1632991"/>
+        <a:ext cx="6777037" cy="1852200"/>
+      </dsp:txXfrm>
+    </dsp:sp>
+    <dsp:sp modelId="{C9E3062B-D232-44DB-A8B8-C4290E87B5B2}">
+      <dsp:nvSpPr>
+        <dsp:cNvPr id="0" name=""/>
+        <dsp:cNvSpPr/>
+      </dsp:nvSpPr>
+      <dsp:spPr>
+        <a:xfrm>
+          <a:off x="338851" y="1323031"/>
+          <a:ext cx="4743925" cy="619920"/>
+        </a:xfrm>
+        <a:prstGeom prst="roundRect">
+          <a:avLst/>
+        </a:prstGeom>
+        <a:gradFill rotWithShape="0">
+          <a:gsLst>
+            <a:gs pos="0">
+              <a:schemeClr val="accent1">
+                <a:hueOff val="0"/>
+                <a:satOff val="0"/>
+                <a:lumOff val="0"/>
+                <a:alphaOff val="0"/>
+                <a:tint val="96000"/>
+                <a:lumMod val="100000"/>
+              </a:schemeClr>
+            </a:gs>
+            <a:gs pos="78000">
+              <a:schemeClr val="accent1">
+                <a:hueOff val="0"/>
+                <a:satOff val="0"/>
+                <a:lumOff val="0"/>
+                <a:alphaOff val="0"/>
+                <a:shade val="94000"/>
+                <a:lumMod val="94000"/>
+              </a:schemeClr>
+            </a:gs>
+          </a:gsLst>
+          <a:lin ang="5400000" scaled="0"/>
+        </a:gradFill>
+        <a:ln>
+          <a:noFill/>
+        </a:ln>
+        <a:effectLst>
+          <a:outerShdw blurRad="50800" dist="38100" dir="5400000" rotWithShape="0">
+            <a:srgbClr val="000000">
+              <a:alpha val="35000"/>
+            </a:srgbClr>
+          </a:outerShdw>
+        </a:effectLst>
+        <a:scene3d>
+          <a:camera prst="orthographicFront">
+            <a:rot lat="0" lon="0" rev="0"/>
+          </a:camera>
+          <a:lightRig rig="threePt" dir="tl"/>
+        </a:scene3d>
+        <a:sp3d prstMaterial="plastic">
+          <a:bevelT w="0" h="0"/>
+        </a:sp3d>
+      </dsp:spPr>
+      <dsp:style>
+        <a:lnRef idx="0">
+          <a:scrgbClr r="0" g="0" b="0"/>
+        </a:lnRef>
+        <a:fillRef idx="3">
+          <a:scrgbClr r="0" g="0" b="0"/>
+        </a:fillRef>
+        <a:effectRef idx="3">
+          <a:scrgbClr r="0" g="0" b="0"/>
+        </a:effectRef>
+        <a:fontRef idx="minor">
+          <a:schemeClr val="lt1"/>
+        </a:fontRef>
+      </dsp:style>
+      <dsp:txBody>
+        <a:bodyPr spcFirstLastPara="0" vert="horz" wrap="square" lIns="179309" tIns="0" rIns="179309" bIns="0" numCol="1" spcCol="1270" anchor="ctr" anchorCtr="0">
+          <a:noAutofit/>
+        </a:bodyPr>
+        <a:lstStyle/>
+        <a:p>
+          <a:pPr lvl="0" algn="l" defTabSz="933450">
+            <a:lnSpc>
+              <a:spcPct val="90000"/>
+            </a:lnSpc>
+            <a:spcBef>
+              <a:spcPct val="0"/>
+            </a:spcBef>
+            <a:spcAft>
+              <a:spcPct val="35000"/>
+            </a:spcAft>
+          </a:pPr>
+          <a:r>
+            <a:rPr lang="fr-FR" sz="2100" kern="1200" dirty="0" smtClean="0"/>
+            <a:t>Développeurs</a:t>
+          </a:r>
+          <a:endParaRPr lang="fr-FR" sz="2100" kern="1200" dirty="0"/>
+        </a:p>
+      </dsp:txBody>
+      <dsp:txXfrm>
+        <a:off x="369113" y="1353293"/>
+        <a:ext cx="4683401" cy="559396"/>
+      </dsp:txXfrm>
+    </dsp:sp>
   </dsp:spTree>
 </dsp:drawing>
 </file>
@@ -11275,7 +12307,11 @@
           <a:p>
             <a:r>
               <a:rPr lang="fr-FR" dirty="0" smtClean="0"/>
-              <a:t>J-Sim Forrest</a:t>
+              <a:t>J-Sim </a:t>
+            </a:r>
+            <a:r>
+              <a:rPr lang="fr-FR" dirty="0" smtClean="0"/>
+              <a:t>Forest</a:t>
             </a:r>
             <a:endParaRPr lang="fr-FR" dirty="0"/>
           </a:p>
@@ -12444,8 +13480,16 @@
           <a:lstStyle/>
           <a:p>
             <a:r>
+              <a:rPr lang="fr-FR" dirty="0" smtClean="0"/>
+              <a:t>Demande</a:t>
+            </a:r>
+            <a:r>
+              <a:rPr lang="fr-FR" dirty="0" smtClean="0"/>
+              <a:t> </a:t>
+            </a:r>
+            <a:r>
               <a:rPr lang="fr-FR" dirty="0"/>
-              <a:t>Besoin du client</a:t>
+              <a:t>du client</a:t>
             </a:r>
           </a:p>
           <a:p>
@@ -12489,20 +13533,12 @@
           <a:p>
             <a:pPr lvl="2"/>
             <a:r>
-              <a:rPr lang="fr-FR" dirty="0">
-                <a:solidFill>
-                  <a:schemeClr val="tx1"/>
-                </a:solidFill>
-              </a:rPr>
-              <a:t>Respecter les demandes du </a:t>
-            </a:r>
-            <a:r>
               <a:rPr lang="fr-FR" dirty="0" smtClean="0">
                 <a:solidFill>
                   <a:schemeClr val="tx1"/>
                 </a:solidFill>
               </a:rPr>
-              <a:t>client </a:t>
+              <a:t>Application JAVA</a:t>
             </a:r>
             <a:endParaRPr lang="fr-FR" dirty="0">
               <a:solidFill>
@@ -12838,6 +13874,624 @@
           </a:p>
         </p:txBody>
       </p:sp>
+      <p:pic>
+        <p:nvPicPr>
+          <p:cNvPr id="4" name="Picture 2" descr="http://weblogs.java.net/blog/campbell/archive/images/orangebox.png"/>
+          <p:cNvPicPr>
+            <a:picLocks noChangeAspect="1" noChangeArrowheads="1"/>
+          </p:cNvPicPr>
+          <p:nvPr/>
+        </p:nvPicPr>
+        <p:blipFill rotWithShape="1">
+          <a:blip r:embed="rId2">
+            <a:extLst>
+              <a:ext uri="{28A0092B-C50C-407E-A947-70E740481C1C}">
+                <a14:useLocalDpi xmlns:a14="http://schemas.microsoft.com/office/drawing/2010/main" val="0"/>
+              </a:ext>
+            </a:extLst>
+          </a:blip>
+          <a:srcRect l="11707" t="2245" r="10289" b="2407"/>
+          <a:stretch/>
+        </p:blipFill>
+        <p:spPr bwMode="auto">
+          <a:xfrm>
+            <a:off x="11342255" y="5957454"/>
+            <a:ext cx="678842" cy="683492"/>
+          </a:xfrm>
+          <a:prstGeom prst="roundRect">
+            <a:avLst>
+              <a:gd name="adj" fmla="val 16667"/>
+            </a:avLst>
+          </a:prstGeom>
+          <a:ln>
+            <a:noFill/>
+          </a:ln>
+          <a:effectLst>
+            <a:outerShdw blurRad="76200" dist="38100" dir="7800000" algn="tl" rotWithShape="0">
+              <a:srgbClr val="000000">
+                <a:alpha val="40000"/>
+              </a:srgbClr>
+            </a:outerShdw>
+          </a:effectLst>
+          <a:scene3d>
+            <a:camera prst="orthographicFront"/>
+            <a:lightRig rig="contrasting" dir="t">
+              <a:rot lat="0" lon="0" rev="4200000"/>
+            </a:lightRig>
+          </a:scene3d>
+          <a:sp3d prstMaterial="plastic">
+            <a:bevelT w="381000" h="114300" prst="relaxedInset"/>
+            <a:contourClr>
+              <a:srgbClr val="969696"/>
+            </a:contourClr>
+          </a:sp3d>
+          <a:extLst>
+            <a:ext uri="{909E8E84-426E-40DD-AFC4-6F175D3DCCD1}">
+              <a14:hiddenFill xmlns:a14="http://schemas.microsoft.com/office/drawing/2010/main">
+                <a:solidFill>
+                  <a:srgbClr val="FFFFFF"/>
+                </a:solidFill>
+              </a14:hiddenFill>
+            </a:ext>
+          </a:extLst>
+        </p:spPr>
+      </p:pic>
+      <p:pic>
+        <p:nvPicPr>
+          <p:cNvPr id="5" name="Image 4"/>
+          <p:cNvPicPr>
+            <a:picLocks noChangeAspect="1"/>
+          </p:cNvPicPr>
+          <p:nvPr/>
+        </p:nvPicPr>
+        <p:blipFill>
+          <a:blip r:embed="rId3"/>
+          <a:stretch>
+            <a:fillRect/>
+          </a:stretch>
+        </p:blipFill>
+        <p:spPr>
+          <a:xfrm flipH="1">
+            <a:off x="584971" y="5987429"/>
+            <a:ext cx="799167" cy="725860"/>
+          </a:xfrm>
+          <a:prstGeom prst="rect">
+            <a:avLst/>
+          </a:prstGeom>
+        </p:spPr>
+      </p:pic>
+      <p:sp>
+        <p:nvSpPr>
+          <p:cNvPr id="6" name="Rectangle 5"/>
+          <p:cNvSpPr/>
+          <p:nvPr/>
+        </p:nvSpPr>
+        <p:spPr>
+          <a:xfrm>
+            <a:off x="5273962" y="5312"/>
+            <a:ext cx="3583709" cy="668944"/>
+          </a:xfrm>
+          <a:prstGeom prst="rect">
+            <a:avLst/>
+          </a:prstGeom>
+          <a:solidFill>
+            <a:srgbClr val="9CC65A"/>
+          </a:solidFill>
+        </p:spPr>
+        <p:style>
+          <a:lnRef idx="2">
+            <a:schemeClr val="accent1">
+              <a:shade val="50000"/>
+            </a:schemeClr>
+          </a:lnRef>
+          <a:fillRef idx="1">
+            <a:schemeClr val="accent1"/>
+          </a:fillRef>
+          <a:effectRef idx="0">
+            <a:schemeClr val="accent1"/>
+          </a:effectRef>
+          <a:fontRef idx="minor">
+            <a:schemeClr val="lt1"/>
+          </a:fontRef>
+        </p:style>
+        <p:txBody>
+          <a:bodyPr rtlCol="0" anchor="ctr"/>
+          <a:lstStyle/>
+          <a:p>
+            <a:pPr algn="ctr"/>
+            <a:endParaRPr lang="fr-FR"/>
+          </a:p>
+        </p:txBody>
+      </p:sp>
+      <p:sp>
+        <p:nvSpPr>
+          <p:cNvPr id="7" name="Rectangle 6"/>
+          <p:cNvSpPr/>
+          <p:nvPr/>
+        </p:nvSpPr>
+        <p:spPr>
+          <a:xfrm>
+            <a:off x="5347852" y="25526"/>
+            <a:ext cx="3435927" cy="556365"/>
+          </a:xfrm>
+          <a:prstGeom prst="rect">
+            <a:avLst/>
+          </a:prstGeom>
+        </p:spPr>
+        <p:style>
+          <a:lnRef idx="2">
+            <a:schemeClr val="accent1">
+              <a:shade val="50000"/>
+            </a:schemeClr>
+          </a:lnRef>
+          <a:fillRef idx="1">
+            <a:schemeClr val="accent1"/>
+          </a:fillRef>
+          <a:effectRef idx="0">
+            <a:schemeClr val="accent1"/>
+          </a:effectRef>
+          <a:fontRef idx="minor">
+            <a:schemeClr val="lt1"/>
+          </a:fontRef>
+        </p:style>
+        <p:txBody>
+          <a:bodyPr rtlCol="0" anchor="ctr"/>
+          <a:lstStyle/>
+          <a:p>
+            <a:pPr algn="ctr"/>
+            <a:endParaRPr lang="fr-FR"/>
+          </a:p>
+        </p:txBody>
+      </p:sp>
+      <p:sp>
+        <p:nvSpPr>
+          <p:cNvPr id="8" name="ZoneTexte 7"/>
+          <p:cNvSpPr txBox="1"/>
+          <p:nvPr/>
+        </p:nvSpPr>
+        <p:spPr>
+          <a:xfrm>
+            <a:off x="5504770" y="226465"/>
+            <a:ext cx="3528392" cy="276999"/>
+          </a:xfrm>
+          <a:prstGeom prst="rect">
+            <a:avLst/>
+          </a:prstGeom>
+          <a:noFill/>
+        </p:spPr>
+        <p:txBody>
+          <a:bodyPr wrap="square" rtlCol="0">
+            <a:spAutoFit/>
+          </a:bodyPr>
+          <a:lstStyle/>
+          <a:p>
+            <a:r>
+              <a:rPr lang="fr-FR" sz="1200" dirty="0" smtClean="0"/>
+              <a:t>Introduction – </a:t>
+            </a:r>
+            <a:r>
+              <a:rPr lang="fr-FR" sz="1200" dirty="0" smtClean="0">
+                <a:solidFill>
+                  <a:schemeClr val="bg1"/>
+                </a:solidFill>
+              </a:rPr>
+              <a:t>Travail effectué </a:t>
+            </a:r>
+            <a:r>
+              <a:rPr lang="fr-FR" sz="1200" dirty="0" smtClean="0"/>
+              <a:t>- Conclusion</a:t>
+            </a:r>
+            <a:endParaRPr lang="fr-FR" sz="1200" dirty="0"/>
+          </a:p>
+        </p:txBody>
+      </p:sp>
+      <p:pic>
+        <p:nvPicPr>
+          <p:cNvPr id="13" name="Image 12"/>
+          <p:cNvPicPr>
+            <a:picLocks noChangeAspect="1"/>
+          </p:cNvPicPr>
+          <p:nvPr/>
+        </p:nvPicPr>
+        <p:blipFill>
+          <a:blip r:embed="rId4"/>
+          <a:stretch>
+            <a:fillRect/>
+          </a:stretch>
+        </p:blipFill>
+        <p:spPr>
+          <a:xfrm>
+            <a:off x="153648" y="2049131"/>
+            <a:ext cx="9525237" cy="2365851"/>
+          </a:xfrm>
+          <a:prstGeom prst="rect">
+            <a:avLst/>
+          </a:prstGeom>
+        </p:spPr>
+      </p:pic>
+    </p:spTree>
+    <p:extLst>
+      <p:ext uri="{BB962C8B-B14F-4D97-AF65-F5344CB8AC3E}">
+        <p14:creationId xmlns:p14="http://schemas.microsoft.com/office/powerpoint/2010/main" val="4104662133"/>
+      </p:ext>
+    </p:extLst>
+  </p:cSld>
+  <p:clrMapOvr>
+    <a:masterClrMapping/>
+  </p:clrMapOvr>
+  <p:timing>
+    <p:tnLst>
+      <p:par>
+        <p:cTn id="1" dur="indefinite" restart="never" nodeType="tmRoot"/>
+      </p:par>
+    </p:tnLst>
+  </p:timing>
+</p:sld>
+</file>
+
+<file path=ppt/slides/slide6.xml><?xml version="1.0" encoding="utf-8"?>
+<p:sld xmlns:a="http://schemas.openxmlformats.org/drawingml/2006/main" xmlns:r="http://schemas.openxmlformats.org/officeDocument/2006/relationships" xmlns:p="http://schemas.openxmlformats.org/presentationml/2006/main">
+  <p:cSld>
+    <p:spTree>
+      <p:nvGrpSpPr>
+        <p:cNvPr id="1" name=""/>
+        <p:cNvGrpSpPr/>
+        <p:nvPr/>
+      </p:nvGrpSpPr>
+      <p:grpSpPr>
+        <a:xfrm>
+          <a:off x="0" y="0"/>
+          <a:ext cx="0" cy="0"/>
+          <a:chOff x="0" y="0"/>
+          <a:chExt cx="0" cy="0"/>
+        </a:xfrm>
+      </p:grpSpPr>
+      <p:sp>
+        <p:nvSpPr>
+          <p:cNvPr id="2" name="Titre 1"/>
+          <p:cNvSpPr>
+            <a:spLocks noGrp="1"/>
+          </p:cNvSpPr>
+          <p:nvPr>
+            <p:ph type="title"/>
+          </p:nvPr>
+        </p:nvSpPr>
+        <p:spPr>
+          <a:xfrm>
+            <a:off x="815776" y="1205054"/>
+            <a:ext cx="4688994" cy="826801"/>
+          </a:xfrm>
+        </p:spPr>
+        <p:txBody>
+          <a:bodyPr/>
+          <a:lstStyle/>
+          <a:p>
+            <a:pPr algn="ctr"/>
+            <a:r>
+              <a:rPr lang="fr-FR" dirty="0" smtClean="0"/>
+              <a:t>Démonstration</a:t>
+            </a:r>
+            <a:endParaRPr lang="fr-FR" dirty="0"/>
+          </a:p>
+        </p:txBody>
+      </p:sp>
+      <p:pic>
+        <p:nvPicPr>
+          <p:cNvPr id="4" name="Picture 2" descr="http://weblogs.java.net/blog/campbell/archive/images/orangebox.png"/>
+          <p:cNvPicPr>
+            <a:picLocks noChangeAspect="1" noChangeArrowheads="1"/>
+          </p:cNvPicPr>
+          <p:nvPr/>
+        </p:nvPicPr>
+        <p:blipFill rotWithShape="1">
+          <a:blip r:embed="rId2">
+            <a:extLst>
+              <a:ext uri="{28A0092B-C50C-407E-A947-70E740481C1C}">
+                <a14:useLocalDpi xmlns:a14="http://schemas.microsoft.com/office/drawing/2010/main" val="0"/>
+              </a:ext>
+            </a:extLst>
+          </a:blip>
+          <a:srcRect l="11707" t="2245" r="10289" b="2407"/>
+          <a:stretch/>
+        </p:blipFill>
+        <p:spPr bwMode="auto">
+          <a:xfrm>
+            <a:off x="11342255" y="5957454"/>
+            <a:ext cx="678842" cy="683492"/>
+          </a:xfrm>
+          <a:prstGeom prst="roundRect">
+            <a:avLst>
+              <a:gd name="adj" fmla="val 16667"/>
+            </a:avLst>
+          </a:prstGeom>
+          <a:ln>
+            <a:noFill/>
+          </a:ln>
+          <a:effectLst>
+            <a:outerShdw blurRad="76200" dist="38100" dir="7800000" algn="tl" rotWithShape="0">
+              <a:srgbClr val="000000">
+                <a:alpha val="40000"/>
+              </a:srgbClr>
+            </a:outerShdw>
+          </a:effectLst>
+          <a:scene3d>
+            <a:camera prst="orthographicFront"/>
+            <a:lightRig rig="contrasting" dir="t">
+              <a:rot lat="0" lon="0" rev="4200000"/>
+            </a:lightRig>
+          </a:scene3d>
+          <a:sp3d prstMaterial="plastic">
+            <a:bevelT w="381000" h="114300" prst="relaxedInset"/>
+            <a:contourClr>
+              <a:srgbClr val="969696"/>
+            </a:contourClr>
+          </a:sp3d>
+          <a:extLst>
+            <a:ext uri="{909E8E84-426E-40DD-AFC4-6F175D3DCCD1}">
+              <a14:hiddenFill xmlns:a14="http://schemas.microsoft.com/office/drawing/2010/main">
+                <a:solidFill>
+                  <a:srgbClr val="FFFFFF"/>
+                </a:solidFill>
+              </a14:hiddenFill>
+            </a:ext>
+          </a:extLst>
+        </p:spPr>
+      </p:pic>
+      <p:pic>
+        <p:nvPicPr>
+          <p:cNvPr id="6" name="Image 5"/>
+          <p:cNvPicPr>
+            <a:picLocks noChangeAspect="1"/>
+          </p:cNvPicPr>
+          <p:nvPr/>
+        </p:nvPicPr>
+        <p:blipFill>
+          <a:blip r:embed="rId3"/>
+          <a:stretch>
+            <a:fillRect/>
+          </a:stretch>
+        </p:blipFill>
+        <p:spPr>
+          <a:xfrm flipH="1">
+            <a:off x="584971" y="5987429"/>
+            <a:ext cx="799167" cy="725860"/>
+          </a:xfrm>
+          <a:prstGeom prst="rect">
+            <a:avLst/>
+          </a:prstGeom>
+        </p:spPr>
+      </p:pic>
+      <p:sp>
+        <p:nvSpPr>
+          <p:cNvPr id="8" name="Rectangle 7"/>
+          <p:cNvSpPr/>
+          <p:nvPr/>
+        </p:nvSpPr>
+        <p:spPr>
+          <a:xfrm>
+            <a:off x="5273962" y="5312"/>
+            <a:ext cx="3583709" cy="668944"/>
+          </a:xfrm>
+          <a:prstGeom prst="rect">
+            <a:avLst/>
+          </a:prstGeom>
+          <a:solidFill>
+            <a:srgbClr val="9CC65A"/>
+          </a:solidFill>
+        </p:spPr>
+        <p:style>
+          <a:lnRef idx="2">
+            <a:schemeClr val="accent1">
+              <a:shade val="50000"/>
+            </a:schemeClr>
+          </a:lnRef>
+          <a:fillRef idx="1">
+            <a:schemeClr val="accent1"/>
+          </a:fillRef>
+          <a:effectRef idx="0">
+            <a:schemeClr val="accent1"/>
+          </a:effectRef>
+          <a:fontRef idx="minor">
+            <a:schemeClr val="lt1"/>
+          </a:fontRef>
+        </p:style>
+        <p:txBody>
+          <a:bodyPr rtlCol="0" anchor="ctr"/>
+          <a:lstStyle/>
+          <a:p>
+            <a:pPr algn="ctr"/>
+            <a:endParaRPr lang="fr-FR"/>
+          </a:p>
+        </p:txBody>
+      </p:sp>
+      <p:sp>
+        <p:nvSpPr>
+          <p:cNvPr id="9" name="Rectangle 8"/>
+          <p:cNvSpPr/>
+          <p:nvPr/>
+        </p:nvSpPr>
+        <p:spPr>
+          <a:xfrm>
+            <a:off x="5347852" y="25526"/>
+            <a:ext cx="3435927" cy="556365"/>
+          </a:xfrm>
+          <a:prstGeom prst="rect">
+            <a:avLst/>
+          </a:prstGeom>
+        </p:spPr>
+        <p:style>
+          <a:lnRef idx="2">
+            <a:schemeClr val="accent1">
+              <a:shade val="50000"/>
+            </a:schemeClr>
+          </a:lnRef>
+          <a:fillRef idx="1">
+            <a:schemeClr val="accent1"/>
+          </a:fillRef>
+          <a:effectRef idx="0">
+            <a:schemeClr val="accent1"/>
+          </a:effectRef>
+          <a:fontRef idx="minor">
+            <a:schemeClr val="lt1"/>
+          </a:fontRef>
+        </p:style>
+        <p:txBody>
+          <a:bodyPr rtlCol="0" anchor="ctr"/>
+          <a:lstStyle/>
+          <a:p>
+            <a:pPr algn="ctr"/>
+            <a:endParaRPr lang="fr-FR"/>
+          </a:p>
+        </p:txBody>
+      </p:sp>
+      <p:sp>
+        <p:nvSpPr>
+          <p:cNvPr id="7" name="ZoneTexte 6"/>
+          <p:cNvSpPr txBox="1"/>
+          <p:nvPr/>
+        </p:nvSpPr>
+        <p:spPr>
+          <a:xfrm>
+            <a:off x="5504770" y="226465"/>
+            <a:ext cx="3528392" cy="276999"/>
+          </a:xfrm>
+          <a:prstGeom prst="rect">
+            <a:avLst/>
+          </a:prstGeom>
+          <a:noFill/>
+        </p:spPr>
+        <p:txBody>
+          <a:bodyPr wrap="square" rtlCol="0">
+            <a:spAutoFit/>
+          </a:bodyPr>
+          <a:lstStyle/>
+          <a:p>
+            <a:r>
+              <a:rPr lang="fr-FR" sz="1200" dirty="0" smtClean="0"/>
+              <a:t>Introduction – </a:t>
+            </a:r>
+            <a:r>
+              <a:rPr lang="fr-FR" sz="1200" dirty="0" smtClean="0">
+                <a:solidFill>
+                  <a:schemeClr val="bg1"/>
+                </a:solidFill>
+              </a:rPr>
+              <a:t>Travail effectué </a:t>
+            </a:r>
+            <a:r>
+              <a:rPr lang="fr-FR" sz="1200" dirty="0" smtClean="0"/>
+              <a:t>- Conclusion</a:t>
+            </a:r>
+            <a:endParaRPr lang="fr-FR" sz="1200" dirty="0"/>
+          </a:p>
+        </p:txBody>
+      </p:sp>
+      <p:pic>
+        <p:nvPicPr>
+          <p:cNvPr id="10" name="Picture 2" descr="http://www.journaldugeek.com/files/2012/09/di-logo-java-orange.png"/>
+          <p:cNvPicPr>
+            <a:picLocks noChangeAspect="1" noChangeArrowheads="1"/>
+          </p:cNvPicPr>
+          <p:nvPr/>
+        </p:nvPicPr>
+        <p:blipFill>
+          <a:blip r:embed="rId4">
+            <a:extLst>
+              <a:ext uri="{28A0092B-C50C-407E-A947-70E740481C1C}">
+                <a14:useLocalDpi xmlns:a14="http://schemas.microsoft.com/office/drawing/2010/main" val="0"/>
+              </a:ext>
+            </a:extLst>
+          </a:blip>
+          <a:srcRect/>
+          <a:stretch>
+            <a:fillRect/>
+          </a:stretch>
+        </p:blipFill>
+        <p:spPr bwMode="auto">
+          <a:xfrm>
+            <a:off x="3656639" y="2562653"/>
+            <a:ext cx="3234645" cy="2587716"/>
+          </a:xfrm>
+          <a:prstGeom prst="ellipse">
+            <a:avLst/>
+          </a:prstGeom>
+          <a:ln>
+            <a:noFill/>
+          </a:ln>
+          <a:effectLst>
+            <a:softEdge rad="112500"/>
+          </a:effectLst>
+          <a:extLst>
+            <a:ext uri="{909E8E84-426E-40DD-AFC4-6F175D3DCCD1}">
+              <a14:hiddenFill xmlns:a14="http://schemas.microsoft.com/office/drawing/2010/main">
+                <a:solidFill>
+                  <a:srgbClr val="FFFFFF"/>
+                </a:solidFill>
+              </a14:hiddenFill>
+            </a:ext>
+          </a:extLst>
+        </p:spPr>
+      </p:pic>
+    </p:spTree>
+    <p:extLst>
+      <p:ext uri="{BB962C8B-B14F-4D97-AF65-F5344CB8AC3E}">
+        <p14:creationId xmlns:p14="http://schemas.microsoft.com/office/powerpoint/2010/main" val="1327431209"/>
+      </p:ext>
+    </p:extLst>
+  </p:cSld>
+  <p:clrMapOvr>
+    <a:masterClrMapping/>
+  </p:clrMapOvr>
+  <p:timing>
+    <p:tnLst>
+      <p:par>
+        <p:cTn id="1" dur="indefinite" restart="never" nodeType="tmRoot"/>
+      </p:par>
+    </p:tnLst>
+  </p:timing>
+</p:sld>
+</file>
+
+<file path=ppt/slides/slide7.xml><?xml version="1.0" encoding="utf-8"?>
+<p:sld xmlns:a="http://schemas.openxmlformats.org/drawingml/2006/main" xmlns:r="http://schemas.openxmlformats.org/officeDocument/2006/relationships" xmlns:p="http://schemas.openxmlformats.org/presentationml/2006/main">
+  <p:cSld>
+    <p:spTree>
+      <p:nvGrpSpPr>
+        <p:cNvPr id="1" name=""/>
+        <p:cNvGrpSpPr/>
+        <p:nvPr/>
+      </p:nvGrpSpPr>
+      <p:grpSpPr>
+        <a:xfrm>
+          <a:off x="0" y="0"/>
+          <a:ext cx="0" cy="0"/>
+          <a:chOff x="0" y="0"/>
+          <a:chExt cx="0" cy="0"/>
+        </a:xfrm>
+      </p:grpSpPr>
+      <p:sp>
+        <p:nvSpPr>
+          <p:cNvPr id="2" name="Titre 1"/>
+          <p:cNvSpPr>
+            <a:spLocks noGrp="1"/>
+          </p:cNvSpPr>
+          <p:nvPr>
+            <p:ph type="title"/>
+          </p:nvPr>
+        </p:nvSpPr>
+        <p:spPr/>
+        <p:txBody>
+          <a:bodyPr/>
+          <a:lstStyle/>
+          <a:p>
+            <a:r>
+              <a:rPr lang="fr-FR" dirty="0" smtClean="0"/>
+              <a:t>Points Forts</a:t>
+            </a:r>
+            <a:endParaRPr lang="fr-FR" dirty="0"/>
+          </a:p>
+        </p:txBody>
+      </p:sp>
       <p:sp>
         <p:nvSpPr>
           <p:cNvPr id="3" name="Espace réservé du contenu 2"/>
@@ -12850,15 +14504,51 @@
         </p:nvSpPr>
         <p:spPr>
           <a:xfrm>
-            <a:off x="677334" y="2160589"/>
-            <a:ext cx="8596668" cy="3131847"/>
+            <a:off x="1275211" y="1930400"/>
+            <a:ext cx="8596668" cy="3880773"/>
           </a:xfrm>
         </p:spPr>
         <p:txBody>
-          <a:bodyPr/>
+          <a:bodyPr>
+            <a:normAutofit/>
+          </a:bodyPr>
           <a:lstStyle/>
           <a:p>
-            <a:endParaRPr lang="fr-FR" dirty="0"/>
+            <a:r>
+              <a:rPr lang="fr-FR" sz="2400" dirty="0" smtClean="0"/>
+              <a:t>Application Ergonomique </a:t>
+            </a:r>
+          </a:p>
+          <a:p>
+            <a:r>
+              <a:rPr lang="fr-FR" sz="2400" dirty="0" smtClean="0"/>
+              <a:t>Changer la taille de la grille et des cellules durant l’exécution</a:t>
+            </a:r>
+          </a:p>
+          <a:p>
+            <a:r>
+              <a:rPr lang="fr-FR" sz="2400" dirty="0" smtClean="0"/>
+              <a:t>Séparation des modes</a:t>
+            </a:r>
+          </a:p>
+          <a:p>
+            <a:r>
+              <a:rPr lang="fr-FR" sz="2400" dirty="0" smtClean="0"/>
+              <a:t>Possibilité de mettre en pause </a:t>
+            </a:r>
+          </a:p>
+          <a:p>
+            <a:r>
+              <a:rPr lang="fr-FR" sz="2400" dirty="0" smtClean="0"/>
+              <a:t>Faire du pas à pas infiniment </a:t>
+            </a:r>
+          </a:p>
+          <a:p>
+            <a:r>
+              <a:rPr lang="fr-FR" sz="2400" dirty="0" smtClean="0"/>
+              <a:t>Export CSV </a:t>
+            </a:r>
+            <a:endParaRPr lang="fr-FR" sz="2400" dirty="0"/>
           </a:p>
         </p:txBody>
       </p:sp>
@@ -13055,7 +14745,7 @@
           <a:p>
             <a:r>
               <a:rPr lang="fr-FR" sz="1200" dirty="0" smtClean="0"/>
-              <a:t>Introduction – </a:t>
+              <a:t>Introduction – Travail effectué - </a:t>
             </a:r>
             <a:r>
               <a:rPr lang="fr-FR" sz="1200" dirty="0" smtClean="0">
@@ -13063,20 +14753,20 @@
                   <a:schemeClr val="bg1"/>
                 </a:solidFill>
               </a:rPr>
-              <a:t>Travail effectué </a:t>
+              <a:t>Conclusion</a:t>
             </a:r>
-            <a:r>
-              <a:rPr lang="fr-FR" sz="1200" dirty="0" smtClean="0"/>
-              <a:t>- Conclusion</a:t>
-            </a:r>
-            <a:endParaRPr lang="fr-FR" sz="1200" dirty="0"/>
+            <a:endParaRPr lang="fr-FR" sz="1200" dirty="0">
+              <a:solidFill>
+                <a:schemeClr val="bg1"/>
+              </a:solidFill>
+            </a:endParaRPr>
           </a:p>
         </p:txBody>
       </p:sp>
     </p:spTree>
     <p:extLst>
       <p:ext uri="{BB962C8B-B14F-4D97-AF65-F5344CB8AC3E}">
-        <p14:creationId xmlns:p14="http://schemas.microsoft.com/office/powerpoint/2010/main" val="4104662133"/>
+        <p14:creationId xmlns:p14="http://schemas.microsoft.com/office/powerpoint/2010/main" val="875868559"/>
       </p:ext>
     </p:extLst>
   </p:cSld>
@@ -13093,7 +14783,7 @@
 </p:sld>
 </file>
 
-<file path=ppt/slides/slide6.xml><?xml version="1.0" encoding="utf-8"?>
+<file path=ppt/slides/slide8.xml><?xml version="1.0" encoding="utf-8"?>
 <p:sld xmlns:a="http://schemas.openxmlformats.org/drawingml/2006/main" xmlns:r="http://schemas.openxmlformats.org/officeDocument/2006/relationships" xmlns:p="http://schemas.openxmlformats.org/presentationml/2006/main">
   <p:cSld>
     <p:spTree>
@@ -13122,337 +14812,18 @@
         </p:nvSpPr>
         <p:spPr>
           <a:xfrm>
-            <a:off x="815776" y="1205054"/>
-            <a:ext cx="4688994" cy="826801"/>
+            <a:off x="723516" y="1043709"/>
+            <a:ext cx="5280121" cy="729673"/>
           </a:xfrm>
         </p:spPr>
         <p:txBody>
           <a:bodyPr/>
           <a:lstStyle/>
           <a:p>
-            <a:pPr algn="ctr"/>
             <a:r>
-              <a:rPr lang="fr-FR" dirty="0" smtClean="0"/>
-              <a:t>Démonstration</a:t>
+              <a:rPr lang="fr-FR" dirty="0"/>
+              <a:t>Perspectives d’évolution</a:t>
             </a:r>
-            <a:endParaRPr lang="fr-FR" dirty="0"/>
-          </a:p>
-        </p:txBody>
-      </p:sp>
-      <p:pic>
-        <p:nvPicPr>
-          <p:cNvPr id="4" name="Picture 2" descr="http://weblogs.java.net/blog/campbell/archive/images/orangebox.png"/>
-          <p:cNvPicPr>
-            <a:picLocks noChangeAspect="1" noChangeArrowheads="1"/>
-          </p:cNvPicPr>
-          <p:nvPr/>
-        </p:nvPicPr>
-        <p:blipFill rotWithShape="1">
-          <a:blip r:embed="rId2">
-            <a:extLst>
-              <a:ext uri="{28A0092B-C50C-407E-A947-70E740481C1C}">
-                <a14:useLocalDpi xmlns:a14="http://schemas.microsoft.com/office/drawing/2010/main" val="0"/>
-              </a:ext>
-            </a:extLst>
-          </a:blip>
-          <a:srcRect l="11707" t="2245" r="10289" b="2407"/>
-          <a:stretch/>
-        </p:blipFill>
-        <p:spPr bwMode="auto">
-          <a:xfrm>
-            <a:off x="11342255" y="5957454"/>
-            <a:ext cx="678842" cy="683492"/>
-          </a:xfrm>
-          <a:prstGeom prst="roundRect">
-            <a:avLst>
-              <a:gd name="adj" fmla="val 16667"/>
-            </a:avLst>
-          </a:prstGeom>
-          <a:ln>
-            <a:noFill/>
-          </a:ln>
-          <a:effectLst>
-            <a:outerShdw blurRad="76200" dist="38100" dir="7800000" algn="tl" rotWithShape="0">
-              <a:srgbClr val="000000">
-                <a:alpha val="40000"/>
-              </a:srgbClr>
-            </a:outerShdw>
-          </a:effectLst>
-          <a:scene3d>
-            <a:camera prst="orthographicFront"/>
-            <a:lightRig rig="contrasting" dir="t">
-              <a:rot lat="0" lon="0" rev="4200000"/>
-            </a:lightRig>
-          </a:scene3d>
-          <a:sp3d prstMaterial="plastic">
-            <a:bevelT w="381000" h="114300" prst="relaxedInset"/>
-            <a:contourClr>
-              <a:srgbClr val="969696"/>
-            </a:contourClr>
-          </a:sp3d>
-          <a:extLst>
-            <a:ext uri="{909E8E84-426E-40DD-AFC4-6F175D3DCCD1}">
-              <a14:hiddenFill xmlns:a14="http://schemas.microsoft.com/office/drawing/2010/main">
-                <a:solidFill>
-                  <a:srgbClr val="FFFFFF"/>
-                </a:solidFill>
-              </a14:hiddenFill>
-            </a:ext>
-          </a:extLst>
-        </p:spPr>
-      </p:pic>
-      <p:pic>
-        <p:nvPicPr>
-          <p:cNvPr id="6" name="Image 5"/>
-          <p:cNvPicPr>
-            <a:picLocks noChangeAspect="1"/>
-          </p:cNvPicPr>
-          <p:nvPr/>
-        </p:nvPicPr>
-        <p:blipFill>
-          <a:blip r:embed="rId3"/>
-          <a:stretch>
-            <a:fillRect/>
-          </a:stretch>
-        </p:blipFill>
-        <p:spPr>
-          <a:xfrm flipH="1">
-            <a:off x="584971" y="5987429"/>
-            <a:ext cx="799167" cy="725860"/>
-          </a:xfrm>
-          <a:prstGeom prst="rect">
-            <a:avLst/>
-          </a:prstGeom>
-        </p:spPr>
-      </p:pic>
-      <p:sp>
-        <p:nvSpPr>
-          <p:cNvPr id="8" name="Rectangle 7"/>
-          <p:cNvSpPr/>
-          <p:nvPr/>
-        </p:nvSpPr>
-        <p:spPr>
-          <a:xfrm>
-            <a:off x="5273962" y="5312"/>
-            <a:ext cx="3583709" cy="668944"/>
-          </a:xfrm>
-          <a:prstGeom prst="rect">
-            <a:avLst/>
-          </a:prstGeom>
-          <a:solidFill>
-            <a:srgbClr val="9CC65A"/>
-          </a:solidFill>
-        </p:spPr>
-        <p:style>
-          <a:lnRef idx="2">
-            <a:schemeClr val="accent1">
-              <a:shade val="50000"/>
-            </a:schemeClr>
-          </a:lnRef>
-          <a:fillRef idx="1">
-            <a:schemeClr val="accent1"/>
-          </a:fillRef>
-          <a:effectRef idx="0">
-            <a:schemeClr val="accent1"/>
-          </a:effectRef>
-          <a:fontRef idx="minor">
-            <a:schemeClr val="lt1"/>
-          </a:fontRef>
-        </p:style>
-        <p:txBody>
-          <a:bodyPr rtlCol="0" anchor="ctr"/>
-          <a:lstStyle/>
-          <a:p>
-            <a:pPr algn="ctr"/>
-            <a:endParaRPr lang="fr-FR"/>
-          </a:p>
-        </p:txBody>
-      </p:sp>
-      <p:sp>
-        <p:nvSpPr>
-          <p:cNvPr id="9" name="Rectangle 8"/>
-          <p:cNvSpPr/>
-          <p:nvPr/>
-        </p:nvSpPr>
-        <p:spPr>
-          <a:xfrm>
-            <a:off x="5347852" y="25526"/>
-            <a:ext cx="3435927" cy="556365"/>
-          </a:xfrm>
-          <a:prstGeom prst="rect">
-            <a:avLst/>
-          </a:prstGeom>
-        </p:spPr>
-        <p:style>
-          <a:lnRef idx="2">
-            <a:schemeClr val="accent1">
-              <a:shade val="50000"/>
-            </a:schemeClr>
-          </a:lnRef>
-          <a:fillRef idx="1">
-            <a:schemeClr val="accent1"/>
-          </a:fillRef>
-          <a:effectRef idx="0">
-            <a:schemeClr val="accent1"/>
-          </a:effectRef>
-          <a:fontRef idx="minor">
-            <a:schemeClr val="lt1"/>
-          </a:fontRef>
-        </p:style>
-        <p:txBody>
-          <a:bodyPr rtlCol="0" anchor="ctr"/>
-          <a:lstStyle/>
-          <a:p>
-            <a:pPr algn="ctr"/>
-            <a:endParaRPr lang="fr-FR"/>
-          </a:p>
-        </p:txBody>
-      </p:sp>
-      <p:sp>
-        <p:nvSpPr>
-          <p:cNvPr id="7" name="ZoneTexte 6"/>
-          <p:cNvSpPr txBox="1"/>
-          <p:nvPr/>
-        </p:nvSpPr>
-        <p:spPr>
-          <a:xfrm>
-            <a:off x="5504770" y="226465"/>
-            <a:ext cx="3528392" cy="276999"/>
-          </a:xfrm>
-          <a:prstGeom prst="rect">
-            <a:avLst/>
-          </a:prstGeom>
-          <a:noFill/>
-        </p:spPr>
-        <p:txBody>
-          <a:bodyPr wrap="square" rtlCol="0">
-            <a:spAutoFit/>
-          </a:bodyPr>
-          <a:lstStyle/>
-          <a:p>
-            <a:r>
-              <a:rPr lang="fr-FR" sz="1200" dirty="0" smtClean="0"/>
-              <a:t>Introduction – </a:t>
-            </a:r>
-            <a:r>
-              <a:rPr lang="fr-FR" sz="1200" dirty="0" smtClean="0">
-                <a:solidFill>
-                  <a:schemeClr val="bg1"/>
-                </a:solidFill>
-              </a:rPr>
-              <a:t>Travail effectué </a:t>
-            </a:r>
-            <a:r>
-              <a:rPr lang="fr-FR" sz="1200" dirty="0" smtClean="0"/>
-              <a:t>- Conclusion</a:t>
-            </a:r>
-            <a:endParaRPr lang="fr-FR" sz="1200" dirty="0"/>
-          </a:p>
-        </p:txBody>
-      </p:sp>
-      <p:pic>
-        <p:nvPicPr>
-          <p:cNvPr id="10" name="Picture 2" descr="http://www.journaldugeek.com/files/2012/09/di-logo-java-orange.png"/>
-          <p:cNvPicPr>
-            <a:picLocks noChangeAspect="1" noChangeArrowheads="1"/>
-          </p:cNvPicPr>
-          <p:nvPr/>
-        </p:nvPicPr>
-        <p:blipFill>
-          <a:blip r:embed="rId4">
-            <a:extLst>
-              <a:ext uri="{28A0092B-C50C-407E-A947-70E740481C1C}">
-                <a14:useLocalDpi xmlns:a14="http://schemas.microsoft.com/office/drawing/2010/main" val="0"/>
-              </a:ext>
-            </a:extLst>
-          </a:blip>
-          <a:srcRect/>
-          <a:stretch>
-            <a:fillRect/>
-          </a:stretch>
-        </p:blipFill>
-        <p:spPr bwMode="auto">
-          <a:xfrm>
-            <a:off x="3656639" y="2562653"/>
-            <a:ext cx="3234645" cy="2587716"/>
-          </a:xfrm>
-          <a:prstGeom prst="ellipse">
-            <a:avLst/>
-          </a:prstGeom>
-          <a:ln>
-            <a:noFill/>
-          </a:ln>
-          <a:effectLst>
-            <a:softEdge rad="112500"/>
-          </a:effectLst>
-          <a:extLst>
-            <a:ext uri="{909E8E84-426E-40DD-AFC4-6F175D3DCCD1}">
-              <a14:hiddenFill xmlns:a14="http://schemas.microsoft.com/office/drawing/2010/main">
-                <a:solidFill>
-                  <a:srgbClr val="FFFFFF"/>
-                </a:solidFill>
-              </a14:hiddenFill>
-            </a:ext>
-          </a:extLst>
-        </p:spPr>
-      </p:pic>
-    </p:spTree>
-    <p:extLst>
-      <p:ext uri="{BB962C8B-B14F-4D97-AF65-F5344CB8AC3E}">
-        <p14:creationId xmlns:p14="http://schemas.microsoft.com/office/powerpoint/2010/main" val="1327431209"/>
-      </p:ext>
-    </p:extLst>
-  </p:cSld>
-  <p:clrMapOvr>
-    <a:masterClrMapping/>
-  </p:clrMapOvr>
-  <p:timing>
-    <p:tnLst>
-      <p:par>
-        <p:cTn id="1" dur="indefinite" restart="never" nodeType="tmRoot"/>
-      </p:par>
-    </p:tnLst>
-  </p:timing>
-</p:sld>
-</file>
-
-<file path=ppt/slides/slide7.xml><?xml version="1.0" encoding="utf-8"?>
-<p:sld xmlns:a="http://schemas.openxmlformats.org/drawingml/2006/main" xmlns:r="http://schemas.openxmlformats.org/officeDocument/2006/relationships" xmlns:p="http://schemas.openxmlformats.org/presentationml/2006/main">
-  <p:cSld>
-    <p:spTree>
-      <p:nvGrpSpPr>
-        <p:cNvPr id="1" name=""/>
-        <p:cNvGrpSpPr/>
-        <p:nvPr/>
-      </p:nvGrpSpPr>
-      <p:grpSpPr>
-        <a:xfrm>
-          <a:off x="0" y="0"/>
-          <a:ext cx="0" cy="0"/>
-          <a:chOff x="0" y="0"/>
-          <a:chExt cx="0" cy="0"/>
-        </a:xfrm>
-      </p:grpSpPr>
-      <p:sp>
-        <p:nvSpPr>
-          <p:cNvPr id="2" name="Titre 1"/>
-          <p:cNvSpPr>
-            <a:spLocks noGrp="1"/>
-          </p:cNvSpPr>
-          <p:nvPr>
-            <p:ph type="title"/>
-          </p:nvPr>
-        </p:nvSpPr>
-        <p:spPr/>
-        <p:txBody>
-          <a:bodyPr/>
-          <a:lstStyle/>
-          <a:p>
-            <a:r>
-              <a:rPr lang="fr-FR" dirty="0" smtClean="0"/>
-              <a:t>Points Forts</a:t>
-            </a:r>
-            <a:endParaRPr lang="fr-FR" dirty="0"/>
           </a:p>
         </p:txBody>
       </p:sp>
@@ -13468,7 +14839,7 @@
         </p:nvSpPr>
         <p:spPr>
           <a:xfrm>
-            <a:off x="1275211" y="1930400"/>
+            <a:off x="2064862" y="2566989"/>
             <a:ext cx="8596668" cy="3880773"/>
           </a:xfrm>
         </p:spPr>
@@ -13478,42 +14849,50 @@
           </a:bodyPr>
           <a:lstStyle/>
           <a:p>
+            <a:pPr lvl="0"/>
             <a:r>
-              <a:rPr lang="fr-FR" sz="2400" dirty="0" smtClean="0"/>
-              <a:t>Application Ergonomique </a:t>
+              <a:rPr lang="fr-FR" sz="2000" dirty="0"/>
+              <a:t>Revenir aux états précédents</a:t>
             </a:r>
           </a:p>
           <a:p>
+            <a:endParaRPr lang="fr-FR" sz="2000" dirty="0"/>
+          </a:p>
+          <a:p>
+            <a:pPr lvl="0"/>
             <a:r>
-              <a:rPr lang="fr-FR" sz="2400" dirty="0" smtClean="0"/>
-              <a:t>Changer la taille de la grille et des cellules durant l’exécution</a:t>
+              <a:rPr lang="fr-FR" sz="2000" dirty="0"/>
+              <a:t>Remplacer les couleurs unies par des images</a:t>
             </a:r>
           </a:p>
           <a:p>
+            <a:endParaRPr lang="fr-FR" sz="2000" dirty="0"/>
+          </a:p>
+          <a:p>
+            <a:pPr lvl="0"/>
             <a:r>
-              <a:rPr lang="fr-FR" sz="2400" dirty="0" smtClean="0"/>
-              <a:t>Séparation des modes</a:t>
+              <a:rPr lang="fr-FR" sz="2000" dirty="0"/>
+              <a:t>Nouveau Look and </a:t>
             </a:r>
-          </a:p>
-          <a:p>
             <a:r>
-              <a:rPr lang="fr-FR" sz="2400" dirty="0" smtClean="0"/>
-              <a:t>Possibilité de mettre en pause </a:t>
+              <a:rPr lang="fr-FR" sz="2000" dirty="0" smtClean="0"/>
+              <a:t>Feel</a:t>
             </a:r>
           </a:p>
           <a:p>
+            <a:pPr lvl="0"/>
+            <a:endParaRPr lang="fr-FR" sz="2000" dirty="0" smtClean="0"/>
+          </a:p>
+          <a:p>
+            <a:pPr lvl="0"/>
             <a:r>
-              <a:rPr lang="fr-FR" sz="2400" dirty="0" smtClean="0"/>
-              <a:t>Faire du pas à pas infiniment </a:t>
+              <a:rPr lang="fr-FR" sz="2000" dirty="0" smtClean="0"/>
+              <a:t>Choisir où exporter le CSV</a:t>
             </a:r>
-            <a:endParaRPr lang="fr-FR" sz="2400" dirty="0" smtClean="0"/>
-          </a:p>
-          <a:p>
-            <a:r>
-              <a:rPr lang="fr-FR" sz="2400" dirty="0" smtClean="0"/>
-              <a:t>Export CSV </a:t>
-            </a:r>
-            <a:endParaRPr lang="fr-FR" sz="2400" dirty="0"/>
+            <a:endParaRPr lang="fr-FR" sz="2000" dirty="0"/>
+          </a:p>
+          <a:p>
+            <a:endParaRPr lang="fr-FR" sz="2000" dirty="0"/>
           </a:p>
         </p:txBody>
       </p:sp>
@@ -13710,343 +15089,6 @@
           <a:p>
             <a:r>
               <a:rPr lang="fr-FR" sz="1200" dirty="0" smtClean="0"/>
-              <a:t>Introduction – Travail effectué - </a:t>
-            </a:r>
-            <a:r>
-              <a:rPr lang="fr-FR" sz="1200" dirty="0" smtClean="0">
-                <a:solidFill>
-                  <a:schemeClr val="bg1"/>
-                </a:solidFill>
-              </a:rPr>
-              <a:t>Conclusion</a:t>
-            </a:r>
-            <a:endParaRPr lang="fr-FR" sz="1200" dirty="0">
-              <a:solidFill>
-                <a:schemeClr val="bg1"/>
-              </a:solidFill>
-            </a:endParaRPr>
-          </a:p>
-        </p:txBody>
-      </p:sp>
-    </p:spTree>
-    <p:extLst>
-      <p:ext uri="{BB962C8B-B14F-4D97-AF65-F5344CB8AC3E}">
-        <p14:creationId xmlns:p14="http://schemas.microsoft.com/office/powerpoint/2010/main" val="875868559"/>
-      </p:ext>
-    </p:extLst>
-  </p:cSld>
-  <p:clrMapOvr>
-    <a:masterClrMapping/>
-  </p:clrMapOvr>
-</p:sld>
-</file>
-
-<file path=ppt/slides/slide8.xml><?xml version="1.0" encoding="utf-8"?>
-<p:sld xmlns:a="http://schemas.openxmlformats.org/drawingml/2006/main" xmlns:r="http://schemas.openxmlformats.org/officeDocument/2006/relationships" xmlns:p="http://schemas.openxmlformats.org/presentationml/2006/main">
-  <p:cSld>
-    <p:spTree>
-      <p:nvGrpSpPr>
-        <p:cNvPr id="1" name=""/>
-        <p:cNvGrpSpPr/>
-        <p:nvPr/>
-      </p:nvGrpSpPr>
-      <p:grpSpPr>
-        <a:xfrm>
-          <a:off x="0" y="0"/>
-          <a:ext cx="0" cy="0"/>
-          <a:chOff x="0" y="0"/>
-          <a:chExt cx="0" cy="0"/>
-        </a:xfrm>
-      </p:grpSpPr>
-      <p:sp>
-        <p:nvSpPr>
-          <p:cNvPr id="2" name="Titre 1"/>
-          <p:cNvSpPr>
-            <a:spLocks noGrp="1"/>
-          </p:cNvSpPr>
-          <p:nvPr>
-            <p:ph type="title"/>
-          </p:nvPr>
-        </p:nvSpPr>
-        <p:spPr>
-          <a:xfrm>
-            <a:off x="723516" y="1043709"/>
-            <a:ext cx="5280121" cy="729673"/>
-          </a:xfrm>
-        </p:spPr>
-        <p:txBody>
-          <a:bodyPr/>
-          <a:lstStyle/>
-          <a:p>
-            <a:r>
-              <a:rPr lang="fr-FR" dirty="0"/>
-              <a:t>Perspectives d’évolution</a:t>
-            </a:r>
-          </a:p>
-        </p:txBody>
-      </p:sp>
-      <p:sp>
-        <p:nvSpPr>
-          <p:cNvPr id="3" name="Espace réservé du contenu 2"/>
-          <p:cNvSpPr>
-            <a:spLocks noGrp="1"/>
-          </p:cNvSpPr>
-          <p:nvPr>
-            <p:ph idx="1"/>
-          </p:nvPr>
-        </p:nvSpPr>
-        <p:spPr>
-          <a:xfrm>
-            <a:off x="2064862" y="2566989"/>
-            <a:ext cx="8596668" cy="3880773"/>
-          </a:xfrm>
-        </p:spPr>
-        <p:txBody>
-          <a:bodyPr>
-            <a:normAutofit/>
-          </a:bodyPr>
-          <a:lstStyle/>
-          <a:p>
-            <a:pPr lvl="0"/>
-            <a:r>
-              <a:rPr lang="fr-FR" sz="2000" dirty="0"/>
-              <a:t>Revenir aux états précédents</a:t>
-            </a:r>
-          </a:p>
-          <a:p>
-            <a:endParaRPr lang="fr-FR" sz="2000" dirty="0"/>
-          </a:p>
-          <a:p>
-            <a:pPr lvl="0"/>
-            <a:r>
-              <a:rPr lang="fr-FR" sz="2000" dirty="0"/>
-              <a:t>Remplacer les couleurs unies par des images</a:t>
-            </a:r>
-          </a:p>
-          <a:p>
-            <a:endParaRPr lang="fr-FR" sz="2000" dirty="0"/>
-          </a:p>
-          <a:p>
-            <a:pPr lvl="0"/>
-            <a:r>
-              <a:rPr lang="fr-FR" sz="2000" dirty="0"/>
-              <a:t>Nouveau Look and </a:t>
-            </a:r>
-            <a:r>
-              <a:rPr lang="fr-FR" sz="2000" dirty="0" smtClean="0"/>
-              <a:t>Feel</a:t>
-            </a:r>
-          </a:p>
-          <a:p>
-            <a:pPr lvl="0"/>
-            <a:endParaRPr lang="fr-FR" sz="2000" dirty="0" smtClean="0"/>
-          </a:p>
-          <a:p>
-            <a:pPr lvl="0"/>
-            <a:r>
-              <a:rPr lang="fr-FR" sz="2000" dirty="0" smtClean="0"/>
-              <a:t>Choisir où exporter le CSV</a:t>
-            </a:r>
-            <a:endParaRPr lang="fr-FR" sz="2000" dirty="0"/>
-          </a:p>
-          <a:p>
-            <a:endParaRPr lang="fr-FR" sz="2000" dirty="0"/>
-          </a:p>
-        </p:txBody>
-      </p:sp>
-      <p:pic>
-        <p:nvPicPr>
-          <p:cNvPr id="4" name="Picture 2" descr="http://weblogs.java.net/blog/campbell/archive/images/orangebox.png"/>
-          <p:cNvPicPr>
-            <a:picLocks noChangeAspect="1" noChangeArrowheads="1"/>
-          </p:cNvPicPr>
-          <p:nvPr/>
-        </p:nvPicPr>
-        <p:blipFill rotWithShape="1">
-          <a:blip r:embed="rId2">
-            <a:extLst>
-              <a:ext uri="{28A0092B-C50C-407E-A947-70E740481C1C}">
-                <a14:useLocalDpi xmlns:a14="http://schemas.microsoft.com/office/drawing/2010/main" val="0"/>
-              </a:ext>
-            </a:extLst>
-          </a:blip>
-          <a:srcRect l="11707" t="2245" r="10289" b="2407"/>
-          <a:stretch/>
-        </p:blipFill>
-        <p:spPr bwMode="auto">
-          <a:xfrm>
-            <a:off x="11342255" y="5957454"/>
-            <a:ext cx="678842" cy="683492"/>
-          </a:xfrm>
-          <a:prstGeom prst="roundRect">
-            <a:avLst>
-              <a:gd name="adj" fmla="val 16667"/>
-            </a:avLst>
-          </a:prstGeom>
-          <a:ln>
-            <a:noFill/>
-          </a:ln>
-          <a:effectLst>
-            <a:outerShdw blurRad="76200" dist="38100" dir="7800000" algn="tl" rotWithShape="0">
-              <a:srgbClr val="000000">
-                <a:alpha val="40000"/>
-              </a:srgbClr>
-            </a:outerShdw>
-          </a:effectLst>
-          <a:scene3d>
-            <a:camera prst="orthographicFront"/>
-            <a:lightRig rig="contrasting" dir="t">
-              <a:rot lat="0" lon="0" rev="4200000"/>
-            </a:lightRig>
-          </a:scene3d>
-          <a:sp3d prstMaterial="plastic">
-            <a:bevelT w="381000" h="114300" prst="relaxedInset"/>
-            <a:contourClr>
-              <a:srgbClr val="969696"/>
-            </a:contourClr>
-          </a:sp3d>
-          <a:extLst>
-            <a:ext uri="{909E8E84-426E-40DD-AFC4-6F175D3DCCD1}">
-              <a14:hiddenFill xmlns:a14="http://schemas.microsoft.com/office/drawing/2010/main">
-                <a:solidFill>
-                  <a:srgbClr val="FFFFFF"/>
-                </a:solidFill>
-              </a14:hiddenFill>
-            </a:ext>
-          </a:extLst>
-        </p:spPr>
-      </p:pic>
-      <p:pic>
-        <p:nvPicPr>
-          <p:cNvPr id="5" name="Image 4"/>
-          <p:cNvPicPr>
-            <a:picLocks noChangeAspect="1"/>
-          </p:cNvPicPr>
-          <p:nvPr/>
-        </p:nvPicPr>
-        <p:blipFill>
-          <a:blip r:embed="rId3"/>
-          <a:stretch>
-            <a:fillRect/>
-          </a:stretch>
-        </p:blipFill>
-        <p:spPr>
-          <a:xfrm flipH="1">
-            <a:off x="584971" y="5987429"/>
-            <a:ext cx="799167" cy="725860"/>
-          </a:xfrm>
-          <a:prstGeom prst="rect">
-            <a:avLst/>
-          </a:prstGeom>
-        </p:spPr>
-      </p:pic>
-      <p:sp>
-        <p:nvSpPr>
-          <p:cNvPr id="6" name="Rectangle 5"/>
-          <p:cNvSpPr/>
-          <p:nvPr/>
-        </p:nvSpPr>
-        <p:spPr>
-          <a:xfrm>
-            <a:off x="5273962" y="5312"/>
-            <a:ext cx="3583709" cy="668944"/>
-          </a:xfrm>
-          <a:prstGeom prst="rect">
-            <a:avLst/>
-          </a:prstGeom>
-          <a:solidFill>
-            <a:srgbClr val="9CC65A"/>
-          </a:solidFill>
-        </p:spPr>
-        <p:style>
-          <a:lnRef idx="2">
-            <a:schemeClr val="accent1">
-              <a:shade val="50000"/>
-            </a:schemeClr>
-          </a:lnRef>
-          <a:fillRef idx="1">
-            <a:schemeClr val="accent1"/>
-          </a:fillRef>
-          <a:effectRef idx="0">
-            <a:schemeClr val="accent1"/>
-          </a:effectRef>
-          <a:fontRef idx="minor">
-            <a:schemeClr val="lt1"/>
-          </a:fontRef>
-        </p:style>
-        <p:txBody>
-          <a:bodyPr rtlCol="0" anchor="ctr"/>
-          <a:lstStyle/>
-          <a:p>
-            <a:pPr algn="ctr"/>
-            <a:endParaRPr lang="fr-FR"/>
-          </a:p>
-        </p:txBody>
-      </p:sp>
-      <p:sp>
-        <p:nvSpPr>
-          <p:cNvPr id="7" name="Rectangle 6"/>
-          <p:cNvSpPr/>
-          <p:nvPr/>
-        </p:nvSpPr>
-        <p:spPr>
-          <a:xfrm>
-            <a:off x="5347852" y="25526"/>
-            <a:ext cx="3435927" cy="556365"/>
-          </a:xfrm>
-          <a:prstGeom prst="rect">
-            <a:avLst/>
-          </a:prstGeom>
-        </p:spPr>
-        <p:style>
-          <a:lnRef idx="2">
-            <a:schemeClr val="accent1">
-              <a:shade val="50000"/>
-            </a:schemeClr>
-          </a:lnRef>
-          <a:fillRef idx="1">
-            <a:schemeClr val="accent1"/>
-          </a:fillRef>
-          <a:effectRef idx="0">
-            <a:schemeClr val="accent1"/>
-          </a:effectRef>
-          <a:fontRef idx="minor">
-            <a:schemeClr val="lt1"/>
-          </a:fontRef>
-        </p:style>
-        <p:txBody>
-          <a:bodyPr rtlCol="0" anchor="ctr"/>
-          <a:lstStyle/>
-          <a:p>
-            <a:pPr algn="ctr"/>
-            <a:endParaRPr lang="fr-FR"/>
-          </a:p>
-        </p:txBody>
-      </p:sp>
-      <p:sp>
-        <p:nvSpPr>
-          <p:cNvPr id="8" name="ZoneTexte 7"/>
-          <p:cNvSpPr txBox="1"/>
-          <p:nvPr/>
-        </p:nvSpPr>
-        <p:spPr>
-          <a:xfrm>
-            <a:off x="5504770" y="226465"/>
-            <a:ext cx="3528392" cy="276999"/>
-          </a:xfrm>
-          <a:prstGeom prst="rect">
-            <a:avLst/>
-          </a:prstGeom>
-          <a:noFill/>
-        </p:spPr>
-        <p:txBody>
-          <a:bodyPr wrap="square" rtlCol="0">
-            <a:spAutoFit/>
-          </a:bodyPr>
-          <a:lstStyle/>
-          <a:p>
-            <a:r>
-              <a:rPr lang="fr-FR" sz="1200" dirty="0" smtClean="0"/>
               <a:t>Introduction – Travail  effectué - </a:t>
             </a:r>
             <a:r>
@@ -14147,13 +15189,23 @@
         </p:spPr>
         <p:txBody>
           <a:bodyPr>
-            <a:normAutofit/>
+            <a:normAutofit fontScale="92500" lnSpcReduction="10000"/>
           </a:bodyPr>
           <a:lstStyle/>
           <a:p>
             <a:r>
+              <a:rPr lang="fr-FR" sz="2800" dirty="0" smtClean="0"/>
+              <a:t>Reste à faire</a:t>
+            </a:r>
+          </a:p>
+          <a:p>
+            <a:r>
+              <a:rPr lang="fr-FR" sz="2800" dirty="0" smtClean="0"/>
+              <a:t>Récapitulatif </a:t>
+            </a:r>
+            <a:r>
               <a:rPr lang="fr-FR" sz="2800" dirty="0"/>
-              <a:t>Récapitulatif du projet</a:t>
+              <a:t>du projet</a:t>
             </a:r>
           </a:p>
           <a:p>

</xml_diff>

<commit_message>
Added the export file, a presentation and modified the classpath
</commit_message>
<xml_diff>
--- a/Documentation/ppt_soutenance.pptx
+++ b/Documentation/ppt_soutenance.pptx
@@ -2231,8 +2231,8 @@
     <dgm:cxn modelId="{2EF138AF-2466-40D4-B5EA-1A9FCD2FD86C}" type="presOf" srcId="{B8D79EC3-D690-4B98-8432-D763CFE24F85}" destId="{038A3218-D924-4E0F-B106-63B5EE221AC4}" srcOrd="0" destOrd="0" presId="urn:microsoft.com/office/officeart/2005/8/layout/vList2"/>
     <dgm:cxn modelId="{C7C8EBF8-508B-4C5E-901B-AB18FE608ADB}" srcId="{E5F76852-CF59-4796-97E9-1DEC1672D6DA}" destId="{7F5559A7-7912-4E1A-B701-EF522B6229BC}" srcOrd="0" destOrd="0" parTransId="{14EEB626-6297-4792-BF56-AE91F621CD34}" sibTransId="{931AA3A2-4E1F-4015-B219-1BE6D3D68F19}"/>
     <dgm:cxn modelId="{1393285D-5A88-4681-84CD-9B8C94443867}" srcId="{E998230F-99D9-435B-8C6C-696A930B37E4}" destId="{A9DC048D-A0BD-4CA2-836C-8AD5D711E713}" srcOrd="0" destOrd="0" parTransId="{1B42BEAA-B6B8-46B0-A024-E71B0C0A8345}" sibTransId="{BA9B6629-AD6C-4EA7-9804-07BE2C8DA76C}"/>
+    <dgm:cxn modelId="{EAE6DDFC-5641-47BC-B93A-DAD47F16F14E}" type="presOf" srcId="{CE356A93-15BE-4B91-A491-4D5727DB6329}" destId="{B5DCC8EC-DC92-4DDC-A601-F883943642EA}" srcOrd="0" destOrd="0" presId="urn:microsoft.com/office/officeart/2005/8/layout/vList2"/>
     <dgm:cxn modelId="{AAE4F25B-9998-4DC5-9389-B79C1BE7497E}" type="presOf" srcId="{4A714CE0-0FDB-4493-B328-248F29D38F60}" destId="{0530B477-2655-4DD8-8202-2C8C8C604F02}" srcOrd="0" destOrd="1" presId="urn:microsoft.com/office/officeart/2005/8/layout/vList2"/>
-    <dgm:cxn modelId="{EAE6DDFC-5641-47BC-B93A-DAD47F16F14E}" type="presOf" srcId="{CE356A93-15BE-4B91-A491-4D5727DB6329}" destId="{B5DCC8EC-DC92-4DDC-A601-F883943642EA}" srcOrd="0" destOrd="0" presId="urn:microsoft.com/office/officeart/2005/8/layout/vList2"/>
     <dgm:cxn modelId="{E087B482-B462-4329-81B9-04A2ED4EEF6C}" srcId="{E5F76852-CF59-4796-97E9-1DEC1672D6DA}" destId="{8D431C77-38B3-4D0F-928A-07333D2AE07F}" srcOrd="2" destOrd="0" parTransId="{96CEEE71-BA5E-4BA5-B3FD-24F8E2E41ADC}" sibTransId="{6DDE85CD-BBA4-4FC5-BA4A-4577618EC847}"/>
     <dgm:cxn modelId="{3CE9FF51-A6B8-4F19-8709-7DEF3763D57F}" type="presOf" srcId="{8A0B6BCC-5488-4238-9BC5-DDCB51F9CD8A}" destId="{0530B477-2655-4DD8-8202-2C8C8C604F02}" srcOrd="0" destOrd="3" presId="urn:microsoft.com/office/officeart/2005/8/layout/vList2"/>
     <dgm:cxn modelId="{50B7762B-CBBD-4F2B-AEF2-1838ADD1D978}" srcId="{CE356A93-15BE-4B91-A491-4D5727DB6329}" destId="{E998230F-99D9-435B-8C6C-696A930B37E4}" srcOrd="0" destOrd="0" parTransId="{FA4314EE-B75E-4B1A-97F0-255BCBDE2F70}" sibTransId="{858C5A1F-D120-46B4-9225-AA79639A6F91}"/>
@@ -12307,11 +12307,7 @@
           <a:p>
             <a:r>
               <a:rPr lang="fr-FR" dirty="0" smtClean="0"/>
-              <a:t>J-Sim </a:t>
-            </a:r>
-            <a:r>
-              <a:rPr lang="fr-FR" dirty="0" smtClean="0"/>
-              <a:t>Forest</a:t>
+              <a:t>J-Sim Forest</a:t>
             </a:r>
             <a:endParaRPr lang="fr-FR" dirty="0"/>
           </a:p>
@@ -13481,11 +13477,7 @@
           <a:p>
             <a:r>
               <a:rPr lang="fr-FR" dirty="0" smtClean="0"/>
-              <a:t>Demande</a:t>
-            </a:r>
-            <a:r>
-              <a:rPr lang="fr-FR" dirty="0" smtClean="0"/>
-              <a:t> </a:t>
+              <a:t>Demande </a:t>
             </a:r>
             <a:r>
               <a:rPr lang="fr-FR" dirty="0"/>
@@ -13857,7 +13849,7 @@
         </p:nvSpPr>
         <p:spPr>
           <a:xfrm>
-            <a:off x="760462" y="1044211"/>
+            <a:off x="747583" y="805412"/>
             <a:ext cx="4864483" cy="842769"/>
           </a:xfrm>
         </p:spPr>
@@ -14101,8 +14093,8 @@
         </p:blipFill>
         <p:spPr>
           <a:xfrm>
-            <a:off x="153648" y="2049131"/>
-            <a:ext cx="9525237" cy="2365851"/>
+            <a:off x="153648" y="1648181"/>
+            <a:ext cx="11867449" cy="4031402"/>
           </a:xfrm>
           <a:prstGeom prst="rect">
             <a:avLst/>
@@ -14388,14 +14380,16 @@
       </p:sp>
       <p:pic>
         <p:nvPicPr>
-          <p:cNvPr id="10" name="Picture 2" descr="http://www.journaldugeek.com/files/2012/09/di-logo-java-orange.png"/>
+          <p:cNvPr id="10" name="Picture 2" descr="http://www.journaldugeek.com/files/2012/09/di-logo-java-orange.png">
+            <a:hlinkClick r:id="rId4" action="ppaction://hlinkfile"/>
+          </p:cNvPr>
           <p:cNvPicPr>
             <a:picLocks noChangeAspect="1" noChangeArrowheads="1"/>
           </p:cNvPicPr>
           <p:nvPr/>
         </p:nvPicPr>
         <p:blipFill>
-          <a:blip r:embed="rId4">
+          <a:blip r:embed="rId5">
             <a:extLst>
               <a:ext uri="{28A0092B-C50C-407E-A947-70E740481C1C}">
                 <a14:useLocalDpi xmlns:a14="http://schemas.microsoft.com/office/drawing/2010/main" val="0"/>

</xml_diff>